<commit_message>
Fixed powerpoint arrows, started regulator mount, added stepper COTS
</commit_message>
<xml_diff>
--- a/So you want to Cad a part.pptx
+++ b/So you want to Cad a part.pptx
@@ -265,7 +265,7 @@
           <a:p>
             <a:fld id="{679B1350-FB35-47B2-9834-223D14293A3A}" type="datetimeFigureOut">
               <a:rPr lang="en-US" smtClean="0"/>
-              <a:t>9/13/2025</a:t>
+              <a:t>9/28/2025</a:t>
             </a:fld>
             <a:endParaRPr lang="en-US"/>
           </a:p>
@@ -463,7 +463,7 @@
           <a:p>
             <a:fld id="{679B1350-FB35-47B2-9834-223D14293A3A}" type="datetimeFigureOut">
               <a:rPr lang="en-US" smtClean="0"/>
-              <a:t>9/13/2025</a:t>
+              <a:t>9/28/2025</a:t>
             </a:fld>
             <a:endParaRPr lang="en-US"/>
           </a:p>
@@ -671,7 +671,7 @@
           <a:p>
             <a:fld id="{679B1350-FB35-47B2-9834-223D14293A3A}" type="datetimeFigureOut">
               <a:rPr lang="en-US" smtClean="0"/>
-              <a:t>9/13/2025</a:t>
+              <a:t>9/28/2025</a:t>
             </a:fld>
             <a:endParaRPr lang="en-US"/>
           </a:p>
@@ -869,7 +869,7 @@
           <a:p>
             <a:fld id="{679B1350-FB35-47B2-9834-223D14293A3A}" type="datetimeFigureOut">
               <a:rPr lang="en-US" smtClean="0"/>
-              <a:t>9/13/2025</a:t>
+              <a:t>9/28/2025</a:t>
             </a:fld>
             <a:endParaRPr lang="en-US"/>
           </a:p>
@@ -1144,7 +1144,7 @@
           <a:p>
             <a:fld id="{679B1350-FB35-47B2-9834-223D14293A3A}" type="datetimeFigureOut">
               <a:rPr lang="en-US" smtClean="0"/>
-              <a:t>9/13/2025</a:t>
+              <a:t>9/28/2025</a:t>
             </a:fld>
             <a:endParaRPr lang="en-US"/>
           </a:p>
@@ -1409,7 +1409,7 @@
           <a:p>
             <a:fld id="{679B1350-FB35-47B2-9834-223D14293A3A}" type="datetimeFigureOut">
               <a:rPr lang="en-US" smtClean="0"/>
-              <a:t>9/13/2025</a:t>
+              <a:t>9/28/2025</a:t>
             </a:fld>
             <a:endParaRPr lang="en-US"/>
           </a:p>
@@ -1821,7 +1821,7 @@
           <a:p>
             <a:fld id="{679B1350-FB35-47B2-9834-223D14293A3A}" type="datetimeFigureOut">
               <a:rPr lang="en-US" smtClean="0"/>
-              <a:t>9/13/2025</a:t>
+              <a:t>9/28/2025</a:t>
             </a:fld>
             <a:endParaRPr lang="en-US"/>
           </a:p>
@@ -1962,7 +1962,7 @@
           <a:p>
             <a:fld id="{679B1350-FB35-47B2-9834-223D14293A3A}" type="datetimeFigureOut">
               <a:rPr lang="en-US" smtClean="0"/>
-              <a:t>9/13/2025</a:t>
+              <a:t>9/28/2025</a:t>
             </a:fld>
             <a:endParaRPr lang="en-US"/>
           </a:p>
@@ -2075,7 +2075,7 @@
           <a:p>
             <a:fld id="{679B1350-FB35-47B2-9834-223D14293A3A}" type="datetimeFigureOut">
               <a:rPr lang="en-US" smtClean="0"/>
-              <a:t>9/13/2025</a:t>
+              <a:t>9/28/2025</a:t>
             </a:fld>
             <a:endParaRPr lang="en-US"/>
           </a:p>
@@ -2386,7 +2386,7 @@
           <a:p>
             <a:fld id="{679B1350-FB35-47B2-9834-223D14293A3A}" type="datetimeFigureOut">
               <a:rPr lang="en-US" smtClean="0"/>
-              <a:t>9/13/2025</a:t>
+              <a:t>9/28/2025</a:t>
             </a:fld>
             <a:endParaRPr lang="en-US"/>
           </a:p>
@@ -2674,7 +2674,7 @@
           <a:p>
             <a:fld id="{679B1350-FB35-47B2-9834-223D14293A3A}" type="datetimeFigureOut">
               <a:rPr lang="en-US" smtClean="0"/>
-              <a:t>9/13/2025</a:t>
+              <a:t>9/28/2025</a:t>
             </a:fld>
             <a:endParaRPr lang="en-US"/>
           </a:p>
@@ -2915,7 +2915,7 @@
           <a:p>
             <a:fld id="{679B1350-FB35-47B2-9834-223D14293A3A}" type="datetimeFigureOut">
               <a:rPr lang="en-US" smtClean="0"/>
-              <a:t>9/13/2025</a:t>
+              <a:t>9/28/2025</a:t>
             </a:fld>
             <a:endParaRPr lang="en-US"/>
           </a:p>
@@ -4814,8 +4814,8 @@
         </p:nvSpPr>
         <p:spPr>
           <a:xfrm>
-            <a:off x="3069167" y="1591734"/>
-            <a:ext cx="2214033" cy="634999"/>
+            <a:off x="3148541" y="1601260"/>
+            <a:ext cx="1604436" cy="634999"/>
           </a:xfrm>
           <a:prstGeom prst="rect">
             <a:avLst/>
@@ -5030,7 +5030,7 @@
         </p:nvSpPr>
         <p:spPr>
           <a:xfrm>
-            <a:off x="4254501" y="3774016"/>
+            <a:off x="4176183" y="3774016"/>
             <a:ext cx="1604434" cy="634999"/>
           </a:xfrm>
           <a:prstGeom prst="rect">
@@ -5138,8 +5138,8 @@
         </p:nvSpPr>
         <p:spPr>
           <a:xfrm>
-            <a:off x="2764367" y="5857344"/>
-            <a:ext cx="2214033" cy="634999"/>
+            <a:off x="2923117" y="5875168"/>
+            <a:ext cx="2055284" cy="634999"/>
           </a:xfrm>
           <a:prstGeom prst="rect">
             <a:avLst/>
@@ -5192,7 +5192,7 @@
         </p:nvSpPr>
         <p:spPr>
           <a:xfrm>
-            <a:off x="4254501" y="4766203"/>
+            <a:off x="4055532" y="4754395"/>
             <a:ext cx="1845735" cy="634999"/>
           </a:xfrm>
           <a:prstGeom prst="rect">
@@ -5242,6 +5242,7 @@
             </a:extLst>
           </p:cNvPr>
           <p:cNvCxnSpPr>
+            <a:cxnSpLocks/>
             <a:stCxn id="4" idx="2"/>
             <a:endCxn id="5" idx="0"/>
           </p:cNvCxnSpPr>
@@ -5249,8 +5250,8 @@
         </p:nvCxnSpPr>
         <p:spPr>
           <a:xfrm rot="5400000">
-            <a:off x="3321580" y="1828271"/>
-            <a:ext cx="456142" cy="1253066"/>
+            <a:off x="3213631" y="1945747"/>
+            <a:ext cx="446616" cy="1027641"/>
           </a:xfrm>
           <a:prstGeom prst="bentConnector3">
             <a:avLst/>
@@ -5292,8 +5293,8 @@
         </p:nvCxnSpPr>
         <p:spPr>
           <a:xfrm rot="16200000" flipH="1">
-            <a:off x="4349221" y="2053696"/>
-            <a:ext cx="456142" cy="802216"/>
+            <a:off x="4241271" y="1945746"/>
+            <a:ext cx="446616" cy="1027641"/>
           </a:xfrm>
           <a:prstGeom prst="bentConnector3">
             <a:avLst>
@@ -5423,7 +5424,7 @@
         <p:spPr>
           <a:xfrm>
             <a:off x="4978400" y="3317874"/>
-            <a:ext cx="78318" cy="456142"/>
+            <a:ext cx="0" cy="456142"/>
           </a:xfrm>
           <a:prstGeom prst="straightConnector1">
             <a:avLst/>
@@ -5465,8 +5466,8 @@
         </p:nvCxnSpPr>
         <p:spPr>
           <a:xfrm>
-            <a:off x="5056718" y="4409015"/>
-            <a:ext cx="120651" cy="357188"/>
+            <a:off x="4978400" y="4409015"/>
+            <a:ext cx="0" cy="345380"/>
           </a:xfrm>
           <a:prstGeom prst="straightConnector1">
             <a:avLst/>
@@ -5508,8 +5509,8 @@
         </p:nvCxnSpPr>
         <p:spPr>
           <a:xfrm rot="5400000">
-            <a:off x="4296306" y="4976281"/>
-            <a:ext cx="456142" cy="1305985"/>
+            <a:off x="4221693" y="5118461"/>
+            <a:ext cx="485774" cy="1027641"/>
           </a:xfrm>
           <a:prstGeom prst="bentConnector3">
             <a:avLst>
@@ -5553,8 +5554,8 @@
         </p:nvCxnSpPr>
         <p:spPr>
           <a:xfrm rot="16200000" flipH="1">
-            <a:off x="3164152" y="5150112"/>
-            <a:ext cx="466198" cy="948266"/>
+            <a:off x="3194927" y="5119336"/>
+            <a:ext cx="484022" cy="1027641"/>
           </a:xfrm>
           <a:prstGeom prst="bentConnector3">
             <a:avLst>

</xml_diff>

<commit_message>
create fluids panel assembly
</commit_message>
<xml_diff>
--- a/So you want to Cad a part.pptx
+++ b/So you want to Cad a part.pptx
@@ -265,7 +265,7 @@
           <a:p>
             <a:fld id="{679B1350-FB35-47B2-9834-223D14293A3A}" type="datetimeFigureOut">
               <a:rPr lang="en-US" smtClean="0"/>
-              <a:t>9/28/2025</a:t>
+              <a:t>10/12/2025</a:t>
             </a:fld>
             <a:endParaRPr lang="en-US"/>
           </a:p>
@@ -463,7 +463,7 @@
           <a:p>
             <a:fld id="{679B1350-FB35-47B2-9834-223D14293A3A}" type="datetimeFigureOut">
               <a:rPr lang="en-US" smtClean="0"/>
-              <a:t>9/28/2025</a:t>
+              <a:t>10/12/2025</a:t>
             </a:fld>
             <a:endParaRPr lang="en-US"/>
           </a:p>
@@ -671,7 +671,7 @@
           <a:p>
             <a:fld id="{679B1350-FB35-47B2-9834-223D14293A3A}" type="datetimeFigureOut">
               <a:rPr lang="en-US" smtClean="0"/>
-              <a:t>9/28/2025</a:t>
+              <a:t>10/12/2025</a:t>
             </a:fld>
             <a:endParaRPr lang="en-US"/>
           </a:p>
@@ -869,7 +869,7 @@
           <a:p>
             <a:fld id="{679B1350-FB35-47B2-9834-223D14293A3A}" type="datetimeFigureOut">
               <a:rPr lang="en-US" smtClean="0"/>
-              <a:t>9/28/2025</a:t>
+              <a:t>10/12/2025</a:t>
             </a:fld>
             <a:endParaRPr lang="en-US"/>
           </a:p>
@@ -1144,7 +1144,7 @@
           <a:p>
             <a:fld id="{679B1350-FB35-47B2-9834-223D14293A3A}" type="datetimeFigureOut">
               <a:rPr lang="en-US" smtClean="0"/>
-              <a:t>9/28/2025</a:t>
+              <a:t>10/12/2025</a:t>
             </a:fld>
             <a:endParaRPr lang="en-US"/>
           </a:p>
@@ -1409,7 +1409,7 @@
           <a:p>
             <a:fld id="{679B1350-FB35-47B2-9834-223D14293A3A}" type="datetimeFigureOut">
               <a:rPr lang="en-US" smtClean="0"/>
-              <a:t>9/28/2025</a:t>
+              <a:t>10/12/2025</a:t>
             </a:fld>
             <a:endParaRPr lang="en-US"/>
           </a:p>
@@ -1821,7 +1821,7 @@
           <a:p>
             <a:fld id="{679B1350-FB35-47B2-9834-223D14293A3A}" type="datetimeFigureOut">
               <a:rPr lang="en-US" smtClean="0"/>
-              <a:t>9/28/2025</a:t>
+              <a:t>10/12/2025</a:t>
             </a:fld>
             <a:endParaRPr lang="en-US"/>
           </a:p>
@@ -1962,7 +1962,7 @@
           <a:p>
             <a:fld id="{679B1350-FB35-47B2-9834-223D14293A3A}" type="datetimeFigureOut">
               <a:rPr lang="en-US" smtClean="0"/>
-              <a:t>9/28/2025</a:t>
+              <a:t>10/12/2025</a:t>
             </a:fld>
             <a:endParaRPr lang="en-US"/>
           </a:p>
@@ -2075,7 +2075,7 @@
           <a:p>
             <a:fld id="{679B1350-FB35-47B2-9834-223D14293A3A}" type="datetimeFigureOut">
               <a:rPr lang="en-US" smtClean="0"/>
-              <a:t>9/28/2025</a:t>
+              <a:t>10/12/2025</a:t>
             </a:fld>
             <a:endParaRPr lang="en-US"/>
           </a:p>
@@ -2386,7 +2386,7 @@
           <a:p>
             <a:fld id="{679B1350-FB35-47B2-9834-223D14293A3A}" type="datetimeFigureOut">
               <a:rPr lang="en-US" smtClean="0"/>
-              <a:t>9/28/2025</a:t>
+              <a:t>10/12/2025</a:t>
             </a:fld>
             <a:endParaRPr lang="en-US"/>
           </a:p>
@@ -2674,7 +2674,7 @@
           <a:p>
             <a:fld id="{679B1350-FB35-47B2-9834-223D14293A3A}" type="datetimeFigureOut">
               <a:rPr lang="en-US" smtClean="0"/>
-              <a:t>9/28/2025</a:t>
+              <a:t>10/12/2025</a:t>
             </a:fld>
             <a:endParaRPr lang="en-US"/>
           </a:p>
@@ -2915,7 +2915,7 @@
           <a:p>
             <a:fld id="{679B1350-FB35-47B2-9834-223D14293A3A}" type="datetimeFigureOut">
               <a:rPr lang="en-US" smtClean="0"/>
-              <a:t>9/28/2025</a:t>
+              <a:t>10/12/2025</a:t>
             </a:fld>
             <a:endParaRPr lang="en-US"/>
           </a:p>

</xml_diff>

<commit_message>
hub and customer AF dwgs
</commit_message>
<xml_diff>
--- a/So you want to Cad a part.pptx
+++ b/So you want to Cad a part.pptx
@@ -4,6 +4,9 @@
   <p:sldMasterIdLst>
     <p:sldMasterId id="2147483648" r:id="rId1"/>
   </p:sldMasterIdLst>
+  <p:notesMasterIdLst>
+    <p:notesMasterId r:id="rId15"/>
+  </p:notesMasterIdLst>
   <p:sldIdLst>
     <p:sldId id="256" r:id="rId2"/>
     <p:sldId id="257" r:id="rId3"/>
@@ -12,6 +15,12 @@
     <p:sldId id="261" r:id="rId6"/>
     <p:sldId id="262" r:id="rId7"/>
     <p:sldId id="260" r:id="rId8"/>
+    <p:sldId id="263" r:id="rId9"/>
+    <p:sldId id="264" r:id="rId10"/>
+    <p:sldId id="265" r:id="rId11"/>
+    <p:sldId id="266" r:id="rId12"/>
+    <p:sldId id="267" r:id="rId13"/>
+    <p:sldId id="268" r:id="rId14"/>
   </p:sldIdLst>
   <p:sldSz cx="12192000" cy="6858000"/>
   <p:notesSz cx="6858000" cy="9144000"/>
@@ -118,6 +127,547 @@
 </p:presentation>
 </file>
 
+<file path=ppt/notesMasters/notesMaster1.xml><?xml version="1.0" encoding="utf-8"?>
+<p:notesMaster xmlns:a="http://schemas.openxmlformats.org/drawingml/2006/main" xmlns:r="http://schemas.openxmlformats.org/officeDocument/2006/relationships" xmlns:p="http://schemas.openxmlformats.org/presentationml/2006/main">
+  <p:cSld>
+    <p:bg>
+      <p:bgRef idx="1001">
+        <a:schemeClr val="bg1"/>
+      </p:bgRef>
+    </p:bg>
+    <p:spTree>
+      <p:nvGrpSpPr>
+        <p:cNvPr id="1" name=""/>
+        <p:cNvGrpSpPr/>
+        <p:nvPr/>
+      </p:nvGrpSpPr>
+      <p:grpSpPr>
+        <a:xfrm>
+          <a:off x="0" y="0"/>
+          <a:ext cx="0" cy="0"/>
+          <a:chOff x="0" y="0"/>
+          <a:chExt cx="0" cy="0"/>
+        </a:xfrm>
+      </p:grpSpPr>
+      <p:sp>
+        <p:nvSpPr>
+          <p:cNvPr id="2" name="Header Placeholder 1"/>
+          <p:cNvSpPr>
+            <a:spLocks noGrp="1"/>
+          </p:cNvSpPr>
+          <p:nvPr>
+            <p:ph type="hdr" sz="quarter"/>
+          </p:nvPr>
+        </p:nvSpPr>
+        <p:spPr>
+          <a:xfrm>
+            <a:off x="0" y="0"/>
+            <a:ext cx="2971800" cy="458788"/>
+          </a:xfrm>
+          <a:prstGeom prst="rect">
+            <a:avLst/>
+          </a:prstGeom>
+        </p:spPr>
+        <p:txBody>
+          <a:bodyPr vert="horz" lIns="91440" tIns="45720" rIns="91440" bIns="45720" rtlCol="0"/>
+          <a:lstStyle>
+            <a:lvl1pPr algn="l">
+              <a:defRPr sz="1200"/>
+            </a:lvl1pPr>
+          </a:lstStyle>
+          <a:p>
+            <a:endParaRPr lang="en-US"/>
+          </a:p>
+        </p:txBody>
+      </p:sp>
+      <p:sp>
+        <p:nvSpPr>
+          <p:cNvPr id="3" name="Date Placeholder 2"/>
+          <p:cNvSpPr>
+            <a:spLocks noGrp="1"/>
+          </p:cNvSpPr>
+          <p:nvPr>
+            <p:ph type="dt" idx="1"/>
+          </p:nvPr>
+        </p:nvSpPr>
+        <p:spPr>
+          <a:xfrm>
+            <a:off x="3884613" y="0"/>
+            <a:ext cx="2971800" cy="458788"/>
+          </a:xfrm>
+          <a:prstGeom prst="rect">
+            <a:avLst/>
+          </a:prstGeom>
+        </p:spPr>
+        <p:txBody>
+          <a:bodyPr vert="horz" lIns="91440" tIns="45720" rIns="91440" bIns="45720" rtlCol="0"/>
+          <a:lstStyle>
+            <a:lvl1pPr algn="r">
+              <a:defRPr sz="1200"/>
+            </a:lvl1pPr>
+          </a:lstStyle>
+          <a:p>
+            <a:fld id="{DC53BAD7-967E-49A4-8AF3-C0ECD204DFD8}" type="datetimeFigureOut">
+              <a:rPr lang="en-US" smtClean="0"/>
+              <a:t>10/24/2025</a:t>
+            </a:fld>
+            <a:endParaRPr lang="en-US"/>
+          </a:p>
+        </p:txBody>
+      </p:sp>
+      <p:sp>
+        <p:nvSpPr>
+          <p:cNvPr id="4" name="Slide Image Placeholder 3"/>
+          <p:cNvSpPr>
+            <a:spLocks noGrp="1" noRot="1" noChangeAspect="1"/>
+          </p:cNvSpPr>
+          <p:nvPr>
+            <p:ph type="sldImg" idx="2"/>
+          </p:nvPr>
+        </p:nvSpPr>
+        <p:spPr>
+          <a:xfrm>
+            <a:off x="685800" y="1143000"/>
+            <a:ext cx="5486400" cy="3086100"/>
+          </a:xfrm>
+          <a:prstGeom prst="rect">
+            <a:avLst/>
+          </a:prstGeom>
+          <a:noFill/>
+          <a:ln w="12700">
+            <a:solidFill>
+              <a:prstClr val="black"/>
+            </a:solidFill>
+          </a:ln>
+        </p:spPr>
+        <p:txBody>
+          <a:bodyPr vert="horz" lIns="91440" tIns="45720" rIns="91440" bIns="45720" rtlCol="0" anchor="ctr"/>
+          <a:lstStyle/>
+          <a:p>
+            <a:endParaRPr lang="en-US"/>
+          </a:p>
+        </p:txBody>
+      </p:sp>
+      <p:sp>
+        <p:nvSpPr>
+          <p:cNvPr id="5" name="Notes Placeholder 4"/>
+          <p:cNvSpPr>
+            <a:spLocks noGrp="1"/>
+          </p:cNvSpPr>
+          <p:nvPr>
+            <p:ph type="body" sz="quarter" idx="3"/>
+          </p:nvPr>
+        </p:nvSpPr>
+        <p:spPr>
+          <a:xfrm>
+            <a:off x="685800" y="4400550"/>
+            <a:ext cx="5486400" cy="3600450"/>
+          </a:xfrm>
+          <a:prstGeom prst="rect">
+            <a:avLst/>
+          </a:prstGeom>
+        </p:spPr>
+        <p:txBody>
+          <a:bodyPr vert="horz" lIns="91440" tIns="45720" rIns="91440" bIns="45720" rtlCol="0"/>
+          <a:lstStyle/>
+          <a:p>
+            <a:pPr lvl="0"/>
+            <a:r>
+              <a:rPr lang="en-US"/>
+              <a:t>Click to edit Master text styles</a:t>
+            </a:r>
+          </a:p>
+          <a:p>
+            <a:pPr lvl="1"/>
+            <a:r>
+              <a:rPr lang="en-US"/>
+              <a:t>Second level</a:t>
+            </a:r>
+          </a:p>
+          <a:p>
+            <a:pPr lvl="2"/>
+            <a:r>
+              <a:rPr lang="en-US"/>
+              <a:t>Third level</a:t>
+            </a:r>
+          </a:p>
+          <a:p>
+            <a:pPr lvl="3"/>
+            <a:r>
+              <a:rPr lang="en-US"/>
+              <a:t>Fourth level</a:t>
+            </a:r>
+          </a:p>
+          <a:p>
+            <a:pPr lvl="4"/>
+            <a:r>
+              <a:rPr lang="en-US"/>
+              <a:t>Fifth level</a:t>
+            </a:r>
+          </a:p>
+        </p:txBody>
+      </p:sp>
+      <p:sp>
+        <p:nvSpPr>
+          <p:cNvPr id="6" name="Footer Placeholder 5"/>
+          <p:cNvSpPr>
+            <a:spLocks noGrp="1"/>
+          </p:cNvSpPr>
+          <p:nvPr>
+            <p:ph type="ftr" sz="quarter" idx="4"/>
+          </p:nvPr>
+        </p:nvSpPr>
+        <p:spPr>
+          <a:xfrm>
+            <a:off x="0" y="8685213"/>
+            <a:ext cx="2971800" cy="458787"/>
+          </a:xfrm>
+          <a:prstGeom prst="rect">
+            <a:avLst/>
+          </a:prstGeom>
+        </p:spPr>
+        <p:txBody>
+          <a:bodyPr vert="horz" lIns="91440" tIns="45720" rIns="91440" bIns="45720" rtlCol="0" anchor="b"/>
+          <a:lstStyle>
+            <a:lvl1pPr algn="l">
+              <a:defRPr sz="1200"/>
+            </a:lvl1pPr>
+          </a:lstStyle>
+          <a:p>
+            <a:endParaRPr lang="en-US"/>
+          </a:p>
+        </p:txBody>
+      </p:sp>
+      <p:sp>
+        <p:nvSpPr>
+          <p:cNvPr id="7" name="Slide Number Placeholder 6"/>
+          <p:cNvSpPr>
+            <a:spLocks noGrp="1"/>
+          </p:cNvSpPr>
+          <p:nvPr>
+            <p:ph type="sldNum" sz="quarter" idx="5"/>
+          </p:nvPr>
+        </p:nvSpPr>
+        <p:spPr>
+          <a:xfrm>
+            <a:off x="3884613" y="8685213"/>
+            <a:ext cx="2971800" cy="458787"/>
+          </a:xfrm>
+          <a:prstGeom prst="rect">
+            <a:avLst/>
+          </a:prstGeom>
+        </p:spPr>
+        <p:txBody>
+          <a:bodyPr vert="horz" lIns="91440" tIns="45720" rIns="91440" bIns="45720" rtlCol="0" anchor="b"/>
+          <a:lstStyle>
+            <a:lvl1pPr algn="r">
+              <a:defRPr sz="1200"/>
+            </a:lvl1pPr>
+          </a:lstStyle>
+          <a:p>
+            <a:fld id="{B05650BD-8A03-405E-A6EF-D44AD3891D08}" type="slidenum">
+              <a:rPr lang="en-US" smtClean="0"/>
+              <a:t>‹#›</a:t>
+            </a:fld>
+            <a:endParaRPr lang="en-US"/>
+          </a:p>
+        </p:txBody>
+      </p:sp>
+    </p:spTree>
+    <p:extLst>
+      <p:ext uri="{BB962C8B-B14F-4D97-AF65-F5344CB8AC3E}">
+        <p14:creationId xmlns:p14="http://schemas.microsoft.com/office/powerpoint/2010/main" val="1468013547"/>
+      </p:ext>
+    </p:extLst>
+  </p:cSld>
+  <p:clrMap bg1="lt1" tx1="dk1" bg2="lt2" tx2="dk2" accent1="accent1" accent2="accent2" accent3="accent3" accent4="accent4" accent5="accent5" accent6="accent6" hlink="hlink" folHlink="folHlink"/>
+  <p:notesStyle>
+    <a:lvl1pPr marL="0" algn="l" defTabSz="914400" rtl="0" eaLnBrk="1" latinLnBrk="0" hangingPunct="1">
+      <a:defRPr sz="1200" kern="1200">
+        <a:solidFill>
+          <a:schemeClr val="tx1"/>
+        </a:solidFill>
+        <a:latin typeface="+mn-lt"/>
+        <a:ea typeface="+mn-ea"/>
+        <a:cs typeface="+mn-cs"/>
+      </a:defRPr>
+    </a:lvl1pPr>
+    <a:lvl2pPr marL="457200" algn="l" defTabSz="914400" rtl="0" eaLnBrk="1" latinLnBrk="0" hangingPunct="1">
+      <a:defRPr sz="1200" kern="1200">
+        <a:solidFill>
+          <a:schemeClr val="tx1"/>
+        </a:solidFill>
+        <a:latin typeface="+mn-lt"/>
+        <a:ea typeface="+mn-ea"/>
+        <a:cs typeface="+mn-cs"/>
+      </a:defRPr>
+    </a:lvl2pPr>
+    <a:lvl3pPr marL="914400" algn="l" defTabSz="914400" rtl="0" eaLnBrk="1" latinLnBrk="0" hangingPunct="1">
+      <a:defRPr sz="1200" kern="1200">
+        <a:solidFill>
+          <a:schemeClr val="tx1"/>
+        </a:solidFill>
+        <a:latin typeface="+mn-lt"/>
+        <a:ea typeface="+mn-ea"/>
+        <a:cs typeface="+mn-cs"/>
+      </a:defRPr>
+    </a:lvl3pPr>
+    <a:lvl4pPr marL="1371600" algn="l" defTabSz="914400" rtl="0" eaLnBrk="1" latinLnBrk="0" hangingPunct="1">
+      <a:defRPr sz="1200" kern="1200">
+        <a:solidFill>
+          <a:schemeClr val="tx1"/>
+        </a:solidFill>
+        <a:latin typeface="+mn-lt"/>
+        <a:ea typeface="+mn-ea"/>
+        <a:cs typeface="+mn-cs"/>
+      </a:defRPr>
+    </a:lvl4pPr>
+    <a:lvl5pPr marL="1828800" algn="l" defTabSz="914400" rtl="0" eaLnBrk="1" latinLnBrk="0" hangingPunct="1">
+      <a:defRPr sz="1200" kern="1200">
+        <a:solidFill>
+          <a:schemeClr val="tx1"/>
+        </a:solidFill>
+        <a:latin typeface="+mn-lt"/>
+        <a:ea typeface="+mn-ea"/>
+        <a:cs typeface="+mn-cs"/>
+      </a:defRPr>
+    </a:lvl5pPr>
+    <a:lvl6pPr marL="2286000" algn="l" defTabSz="914400" rtl="0" eaLnBrk="1" latinLnBrk="0" hangingPunct="1">
+      <a:defRPr sz="1200" kern="1200">
+        <a:solidFill>
+          <a:schemeClr val="tx1"/>
+        </a:solidFill>
+        <a:latin typeface="+mn-lt"/>
+        <a:ea typeface="+mn-ea"/>
+        <a:cs typeface="+mn-cs"/>
+      </a:defRPr>
+    </a:lvl6pPr>
+    <a:lvl7pPr marL="2743200" algn="l" defTabSz="914400" rtl="0" eaLnBrk="1" latinLnBrk="0" hangingPunct="1">
+      <a:defRPr sz="1200" kern="1200">
+        <a:solidFill>
+          <a:schemeClr val="tx1"/>
+        </a:solidFill>
+        <a:latin typeface="+mn-lt"/>
+        <a:ea typeface="+mn-ea"/>
+        <a:cs typeface="+mn-cs"/>
+      </a:defRPr>
+    </a:lvl7pPr>
+    <a:lvl8pPr marL="3200400" algn="l" defTabSz="914400" rtl="0" eaLnBrk="1" latinLnBrk="0" hangingPunct="1">
+      <a:defRPr sz="1200" kern="1200">
+        <a:solidFill>
+          <a:schemeClr val="tx1"/>
+        </a:solidFill>
+        <a:latin typeface="+mn-lt"/>
+        <a:ea typeface="+mn-ea"/>
+        <a:cs typeface="+mn-cs"/>
+      </a:defRPr>
+    </a:lvl8pPr>
+    <a:lvl9pPr marL="3657600" algn="l" defTabSz="914400" rtl="0" eaLnBrk="1" latinLnBrk="0" hangingPunct="1">
+      <a:defRPr sz="1200" kern="1200">
+        <a:solidFill>
+          <a:schemeClr val="tx1"/>
+        </a:solidFill>
+        <a:latin typeface="+mn-lt"/>
+        <a:ea typeface="+mn-ea"/>
+        <a:cs typeface="+mn-cs"/>
+      </a:defRPr>
+    </a:lvl9pPr>
+  </p:notesStyle>
+</p:notesMaster>
+</file>
+
+<file path=ppt/notesSlides/notesSlide1.xml><?xml version="1.0" encoding="utf-8"?>
+<p:notes xmlns:a="http://schemas.openxmlformats.org/drawingml/2006/main" xmlns:r="http://schemas.openxmlformats.org/officeDocument/2006/relationships" xmlns:p="http://schemas.openxmlformats.org/presentationml/2006/main">
+  <p:cSld>
+    <p:spTree>
+      <p:nvGrpSpPr>
+        <p:cNvPr id="1" name=""/>
+        <p:cNvGrpSpPr/>
+        <p:nvPr/>
+      </p:nvGrpSpPr>
+      <p:grpSpPr>
+        <a:xfrm>
+          <a:off x="0" y="0"/>
+          <a:ext cx="0" cy="0"/>
+          <a:chOff x="0" y="0"/>
+          <a:chExt cx="0" cy="0"/>
+        </a:xfrm>
+      </p:grpSpPr>
+      <p:sp>
+        <p:nvSpPr>
+          <p:cNvPr id="2" name="Slide Image Placeholder 1"/>
+          <p:cNvSpPr>
+            <a:spLocks noGrp="1" noRot="1" noChangeAspect="1"/>
+          </p:cNvSpPr>
+          <p:nvPr>
+            <p:ph type="sldImg"/>
+          </p:nvPr>
+        </p:nvSpPr>
+        <p:spPr/>
+      </p:sp>
+      <p:sp>
+        <p:nvSpPr>
+          <p:cNvPr id="3" name="Notes Placeholder 2"/>
+          <p:cNvSpPr>
+            <a:spLocks noGrp="1"/>
+          </p:cNvSpPr>
+          <p:nvPr>
+            <p:ph type="body" idx="1"/>
+          </p:nvPr>
+        </p:nvSpPr>
+        <p:spPr/>
+        <p:txBody>
+          <a:bodyPr/>
+          <a:lstStyle/>
+          <a:p>
+            <a:endParaRPr lang="en-US" dirty="0"/>
+          </a:p>
+        </p:txBody>
+      </p:sp>
+      <p:sp>
+        <p:nvSpPr>
+          <p:cNvPr id="4" name="Slide Number Placeholder 3"/>
+          <p:cNvSpPr>
+            <a:spLocks noGrp="1"/>
+          </p:cNvSpPr>
+          <p:nvPr>
+            <p:ph type="sldNum" sz="quarter" idx="5"/>
+          </p:nvPr>
+        </p:nvSpPr>
+        <p:spPr/>
+        <p:txBody>
+          <a:bodyPr/>
+          <a:lstStyle/>
+          <a:p>
+            <a:fld id="{B05650BD-8A03-405E-A6EF-D44AD3891D08}" type="slidenum">
+              <a:rPr lang="en-US" smtClean="0"/>
+              <a:t>7</a:t>
+            </a:fld>
+            <a:endParaRPr lang="en-US"/>
+          </a:p>
+        </p:txBody>
+      </p:sp>
+    </p:spTree>
+    <p:extLst>
+      <p:ext uri="{BB962C8B-B14F-4D97-AF65-F5344CB8AC3E}">
+        <p14:creationId xmlns:p14="http://schemas.microsoft.com/office/powerpoint/2010/main" val="346175132"/>
+      </p:ext>
+    </p:extLst>
+  </p:cSld>
+  <p:clrMapOvr>
+    <a:masterClrMapping/>
+  </p:clrMapOvr>
+</p:notes>
+</file>
+
+<file path=ppt/notesSlides/notesSlide2.xml><?xml version="1.0" encoding="utf-8"?>
+<p:notes xmlns:a="http://schemas.openxmlformats.org/drawingml/2006/main" xmlns:r="http://schemas.openxmlformats.org/officeDocument/2006/relationships" xmlns:p="http://schemas.openxmlformats.org/presentationml/2006/main">
+  <p:cSld>
+    <p:spTree>
+      <p:nvGrpSpPr>
+        <p:cNvPr id="1" name="">
+          <a:extLst>
+            <a:ext uri="{FF2B5EF4-FFF2-40B4-BE49-F238E27FC236}">
+              <a16:creationId xmlns:a16="http://schemas.microsoft.com/office/drawing/2014/main" id="{F4C7AAD7-61DD-351F-7E7B-024ADB7683FC}"/>
+            </a:ext>
+          </a:extLst>
+        </p:cNvPr>
+        <p:cNvGrpSpPr/>
+        <p:nvPr/>
+      </p:nvGrpSpPr>
+      <p:grpSpPr>
+        <a:xfrm>
+          <a:off x="0" y="0"/>
+          <a:ext cx="0" cy="0"/>
+          <a:chOff x="0" y="0"/>
+          <a:chExt cx="0" cy="0"/>
+        </a:xfrm>
+      </p:grpSpPr>
+      <p:sp>
+        <p:nvSpPr>
+          <p:cNvPr id="2" name="Slide Image Placeholder 1">
+            <a:extLst>
+              <a:ext uri="{FF2B5EF4-FFF2-40B4-BE49-F238E27FC236}">
+                <a16:creationId xmlns:a16="http://schemas.microsoft.com/office/drawing/2014/main" id="{59A8004D-B377-96D2-DD7D-2E1521289E9F}"/>
+              </a:ext>
+            </a:extLst>
+          </p:cNvPr>
+          <p:cNvSpPr>
+            <a:spLocks noGrp="1" noRot="1" noChangeAspect="1"/>
+          </p:cNvSpPr>
+          <p:nvPr>
+            <p:ph type="sldImg"/>
+          </p:nvPr>
+        </p:nvSpPr>
+        <p:spPr/>
+      </p:sp>
+      <p:sp>
+        <p:nvSpPr>
+          <p:cNvPr id="3" name="Notes Placeholder 2">
+            <a:extLst>
+              <a:ext uri="{FF2B5EF4-FFF2-40B4-BE49-F238E27FC236}">
+                <a16:creationId xmlns:a16="http://schemas.microsoft.com/office/drawing/2014/main" id="{6983FAFC-3107-89F4-38FE-6ACE064DD442}"/>
+              </a:ext>
+            </a:extLst>
+          </p:cNvPr>
+          <p:cNvSpPr>
+            <a:spLocks noGrp="1"/>
+          </p:cNvSpPr>
+          <p:nvPr>
+            <p:ph type="body" idx="1"/>
+          </p:nvPr>
+        </p:nvSpPr>
+        <p:spPr/>
+        <p:txBody>
+          <a:bodyPr/>
+          <a:lstStyle/>
+          <a:p>
+            <a:endParaRPr lang="en-US" dirty="0"/>
+          </a:p>
+        </p:txBody>
+      </p:sp>
+      <p:sp>
+        <p:nvSpPr>
+          <p:cNvPr id="4" name="Slide Number Placeholder 3">
+            <a:extLst>
+              <a:ext uri="{FF2B5EF4-FFF2-40B4-BE49-F238E27FC236}">
+                <a16:creationId xmlns:a16="http://schemas.microsoft.com/office/drawing/2014/main" id="{97BD970C-D658-1E02-C08A-3711649E8B5C}"/>
+              </a:ext>
+            </a:extLst>
+          </p:cNvPr>
+          <p:cNvSpPr>
+            <a:spLocks noGrp="1"/>
+          </p:cNvSpPr>
+          <p:nvPr>
+            <p:ph type="sldNum" sz="quarter" idx="5"/>
+          </p:nvPr>
+        </p:nvSpPr>
+        <p:spPr/>
+        <p:txBody>
+          <a:bodyPr/>
+          <a:lstStyle/>
+          <a:p>
+            <a:fld id="{B05650BD-8A03-405E-A6EF-D44AD3891D08}" type="slidenum">
+              <a:rPr lang="en-US" smtClean="0"/>
+              <a:t>8</a:t>
+            </a:fld>
+            <a:endParaRPr lang="en-US"/>
+          </a:p>
+        </p:txBody>
+      </p:sp>
+    </p:spTree>
+    <p:extLst>
+      <p:ext uri="{BB962C8B-B14F-4D97-AF65-F5344CB8AC3E}">
+        <p14:creationId xmlns:p14="http://schemas.microsoft.com/office/powerpoint/2010/main" val="2912370723"/>
+      </p:ext>
+    </p:extLst>
+  </p:cSld>
+  <p:clrMapOvr>
+    <a:masterClrMapping/>
+  </p:clrMapOvr>
+</p:notes>
+</file>
+
 <file path=ppt/slideLayouts/slideLayout1.xml><?xml version="1.0" encoding="utf-8"?>
 <p:sldLayout xmlns:a="http://schemas.openxmlformats.org/drawingml/2006/main" xmlns:r="http://schemas.openxmlformats.org/officeDocument/2006/relationships" xmlns:p="http://schemas.openxmlformats.org/presentationml/2006/main" type="title" preserve="1">
   <p:cSld name="Title Slide">
@@ -265,7 +815,7 @@
           <a:p>
             <a:fld id="{679B1350-FB35-47B2-9834-223D14293A3A}" type="datetimeFigureOut">
               <a:rPr lang="en-US" smtClean="0"/>
-              <a:t>10/12/2025</a:t>
+              <a:t>10/24/2025</a:t>
             </a:fld>
             <a:endParaRPr lang="en-US"/>
           </a:p>
@@ -463,7 +1013,7 @@
           <a:p>
             <a:fld id="{679B1350-FB35-47B2-9834-223D14293A3A}" type="datetimeFigureOut">
               <a:rPr lang="en-US" smtClean="0"/>
-              <a:t>10/12/2025</a:t>
+              <a:t>10/24/2025</a:t>
             </a:fld>
             <a:endParaRPr lang="en-US"/>
           </a:p>
@@ -671,7 +1221,7 @@
           <a:p>
             <a:fld id="{679B1350-FB35-47B2-9834-223D14293A3A}" type="datetimeFigureOut">
               <a:rPr lang="en-US" smtClean="0"/>
-              <a:t>10/12/2025</a:t>
+              <a:t>10/24/2025</a:t>
             </a:fld>
             <a:endParaRPr lang="en-US"/>
           </a:p>
@@ -869,7 +1419,7 @@
           <a:p>
             <a:fld id="{679B1350-FB35-47B2-9834-223D14293A3A}" type="datetimeFigureOut">
               <a:rPr lang="en-US" smtClean="0"/>
-              <a:t>10/12/2025</a:t>
+              <a:t>10/24/2025</a:t>
             </a:fld>
             <a:endParaRPr lang="en-US"/>
           </a:p>
@@ -1144,7 +1694,7 @@
           <a:p>
             <a:fld id="{679B1350-FB35-47B2-9834-223D14293A3A}" type="datetimeFigureOut">
               <a:rPr lang="en-US" smtClean="0"/>
-              <a:t>10/12/2025</a:t>
+              <a:t>10/24/2025</a:t>
             </a:fld>
             <a:endParaRPr lang="en-US"/>
           </a:p>
@@ -1409,7 +1959,7 @@
           <a:p>
             <a:fld id="{679B1350-FB35-47B2-9834-223D14293A3A}" type="datetimeFigureOut">
               <a:rPr lang="en-US" smtClean="0"/>
-              <a:t>10/12/2025</a:t>
+              <a:t>10/24/2025</a:t>
             </a:fld>
             <a:endParaRPr lang="en-US"/>
           </a:p>
@@ -1821,7 +2371,7 @@
           <a:p>
             <a:fld id="{679B1350-FB35-47B2-9834-223D14293A3A}" type="datetimeFigureOut">
               <a:rPr lang="en-US" smtClean="0"/>
-              <a:t>10/12/2025</a:t>
+              <a:t>10/24/2025</a:t>
             </a:fld>
             <a:endParaRPr lang="en-US"/>
           </a:p>
@@ -1962,7 +2512,7 @@
           <a:p>
             <a:fld id="{679B1350-FB35-47B2-9834-223D14293A3A}" type="datetimeFigureOut">
               <a:rPr lang="en-US" smtClean="0"/>
-              <a:t>10/12/2025</a:t>
+              <a:t>10/24/2025</a:t>
             </a:fld>
             <a:endParaRPr lang="en-US"/>
           </a:p>
@@ -2075,7 +2625,7 @@
           <a:p>
             <a:fld id="{679B1350-FB35-47B2-9834-223D14293A3A}" type="datetimeFigureOut">
               <a:rPr lang="en-US" smtClean="0"/>
-              <a:t>10/12/2025</a:t>
+              <a:t>10/24/2025</a:t>
             </a:fld>
             <a:endParaRPr lang="en-US"/>
           </a:p>
@@ -2386,7 +2936,7 @@
           <a:p>
             <a:fld id="{679B1350-FB35-47B2-9834-223D14293A3A}" type="datetimeFigureOut">
               <a:rPr lang="en-US" smtClean="0"/>
-              <a:t>10/12/2025</a:t>
+              <a:t>10/24/2025</a:t>
             </a:fld>
             <a:endParaRPr lang="en-US"/>
           </a:p>
@@ -2674,7 +3224,7 @@
           <a:p>
             <a:fld id="{679B1350-FB35-47B2-9834-223D14293A3A}" type="datetimeFigureOut">
               <a:rPr lang="en-US" smtClean="0"/>
-              <a:t>10/12/2025</a:t>
+              <a:t>10/24/2025</a:t>
             </a:fld>
             <a:endParaRPr lang="en-US"/>
           </a:p>
@@ -2915,7 +3465,7 @@
           <a:p>
             <a:fld id="{679B1350-FB35-47B2-9834-223D14293A3A}" type="datetimeFigureOut">
               <a:rPr lang="en-US" smtClean="0"/>
-              <a:t>10/12/2025</a:t>
+              <a:t>10/24/2025</a:t>
             </a:fld>
             <a:endParaRPr lang="en-US"/>
           </a:p>
@@ -3373,6 +3923,733 @@
 </p:sld>
 </file>
 
+<file path=ppt/slides/slide10.xml><?xml version="1.0" encoding="utf-8"?>
+<p:sld xmlns:a="http://schemas.openxmlformats.org/drawingml/2006/main" xmlns:r="http://schemas.openxmlformats.org/officeDocument/2006/relationships" xmlns:p="http://schemas.openxmlformats.org/presentationml/2006/main">
+  <p:cSld>
+    <p:spTree>
+      <p:nvGrpSpPr>
+        <p:cNvPr id="1" name=""/>
+        <p:cNvGrpSpPr/>
+        <p:nvPr/>
+      </p:nvGrpSpPr>
+      <p:grpSpPr>
+        <a:xfrm>
+          <a:off x="0" y="0"/>
+          <a:ext cx="0" cy="0"/>
+          <a:chOff x="0" y="0"/>
+          <a:chExt cx="0" cy="0"/>
+        </a:xfrm>
+      </p:grpSpPr>
+      <p:sp>
+        <p:nvSpPr>
+          <p:cNvPr id="2" name="Title 1">
+            <a:extLst>
+              <a:ext uri="{FF2B5EF4-FFF2-40B4-BE49-F238E27FC236}">
+                <a16:creationId xmlns:a16="http://schemas.microsoft.com/office/drawing/2014/main" id="{537120A9-781E-EB19-5A92-34AE5AA73306}"/>
+              </a:ext>
+            </a:extLst>
+          </p:cNvPr>
+          <p:cNvSpPr>
+            <a:spLocks noGrp="1"/>
+          </p:cNvSpPr>
+          <p:nvPr>
+            <p:ph type="title"/>
+          </p:nvPr>
+        </p:nvSpPr>
+        <p:spPr/>
+        <p:txBody>
+          <a:bodyPr/>
+          <a:lstStyle/>
+          <a:p>
+            <a:r>
+              <a:rPr lang="en-US" dirty="0"/>
+              <a:t>Load TEMPLATE</a:t>
+            </a:r>
+          </a:p>
+        </p:txBody>
+      </p:sp>
+      <p:sp>
+        <p:nvSpPr>
+          <p:cNvPr id="3" name="Content Placeholder 2">
+            <a:extLst>
+              <a:ext uri="{FF2B5EF4-FFF2-40B4-BE49-F238E27FC236}">
+                <a16:creationId xmlns:a16="http://schemas.microsoft.com/office/drawing/2014/main" id="{E50938D9-64CD-94BE-9C5D-32F039A38B5B}"/>
+              </a:ext>
+            </a:extLst>
+          </p:cNvPr>
+          <p:cNvSpPr>
+            <a:spLocks noGrp="1"/>
+          </p:cNvSpPr>
+          <p:nvPr>
+            <p:ph idx="1"/>
+          </p:nvPr>
+        </p:nvSpPr>
+        <p:spPr>
+          <a:xfrm>
+            <a:off x="838200" y="1825625"/>
+            <a:ext cx="4922713" cy="4351338"/>
+          </a:xfrm>
+        </p:spPr>
+        <p:txBody>
+          <a:bodyPr>
+            <a:normAutofit/>
+          </a:bodyPr>
+          <a:lstStyle/>
+          <a:p>
+            <a:pPr marL="514350" indent="-514350">
+              <a:buFont typeface="+mj-lt"/>
+              <a:buAutoNum type="arabicPeriod"/>
+            </a:pPr>
+            <a:r>
+              <a:rPr lang="en-US" sz="1600" dirty="0"/>
+              <a:t>Load TEMPLATE.PRT and go to drafting application</a:t>
+            </a:r>
+          </a:p>
+          <a:p>
+            <a:pPr marL="514350" indent="-514350">
+              <a:buFont typeface="+mj-lt"/>
+              <a:buAutoNum type="arabicPeriod"/>
+            </a:pPr>
+            <a:r>
+              <a:rPr lang="en-US" sz="1600" dirty="0"/>
+              <a:t>Go to Drafting Tools and click mark as template</a:t>
+            </a:r>
+          </a:p>
+          <a:p>
+            <a:pPr marL="514350" indent="-514350">
+              <a:buFont typeface="+mj-lt"/>
+              <a:buAutoNum type="arabicPeriod"/>
+            </a:pPr>
+            <a:r>
+              <a:rPr lang="en-US" sz="1600" dirty="0"/>
+              <a:t>Mark Template and update PAX file, then save </a:t>
+            </a:r>
+            <a:r>
+              <a:rPr lang="en-US" sz="1600" dirty="0" err="1"/>
+              <a:t>TEMPLATE.prt</a:t>
+            </a:r>
+            <a:endParaRPr lang="en-US" sz="1600" dirty="0"/>
+          </a:p>
+          <a:p>
+            <a:pPr marL="514350" indent="-514350">
+              <a:buFont typeface="+mj-lt"/>
+              <a:buAutoNum type="arabicPeriod"/>
+            </a:pPr>
+            <a:endParaRPr lang="en-US" sz="1600" dirty="0"/>
+          </a:p>
+        </p:txBody>
+      </p:sp>
+      <p:pic>
+        <p:nvPicPr>
+          <p:cNvPr id="5" name="Picture 4">
+            <a:extLst>
+              <a:ext uri="{FF2B5EF4-FFF2-40B4-BE49-F238E27FC236}">
+                <a16:creationId xmlns:a16="http://schemas.microsoft.com/office/drawing/2014/main" id="{329C5ED2-FDB6-1D8A-0DAB-EF100C49DF61}"/>
+              </a:ext>
+            </a:extLst>
+          </p:cNvPr>
+          <p:cNvPicPr>
+            <a:picLocks noChangeAspect="1"/>
+          </p:cNvPicPr>
+          <p:nvPr/>
+        </p:nvPicPr>
+        <p:blipFill>
+          <a:blip r:embed="rId2"/>
+          <a:stretch>
+            <a:fillRect/>
+          </a:stretch>
+        </p:blipFill>
+        <p:spPr>
+          <a:xfrm>
+            <a:off x="6096000" y="607206"/>
+            <a:ext cx="5132534" cy="841399"/>
+          </a:xfrm>
+          <a:prstGeom prst="rect">
+            <a:avLst/>
+          </a:prstGeom>
+        </p:spPr>
+      </p:pic>
+      <p:pic>
+        <p:nvPicPr>
+          <p:cNvPr id="7" name="Picture 6">
+            <a:extLst>
+              <a:ext uri="{FF2B5EF4-FFF2-40B4-BE49-F238E27FC236}">
+                <a16:creationId xmlns:a16="http://schemas.microsoft.com/office/drawing/2014/main" id="{5CD34861-9D45-8F57-6390-DE7296CC2D67}"/>
+              </a:ext>
+            </a:extLst>
+          </p:cNvPr>
+          <p:cNvPicPr>
+            <a:picLocks noChangeAspect="1"/>
+          </p:cNvPicPr>
+          <p:nvPr/>
+        </p:nvPicPr>
+        <p:blipFill>
+          <a:blip r:embed="rId3"/>
+          <a:stretch>
+            <a:fillRect/>
+          </a:stretch>
+        </p:blipFill>
+        <p:spPr>
+          <a:xfrm>
+            <a:off x="6096000" y="1825625"/>
+            <a:ext cx="5562637" cy="1190724"/>
+          </a:xfrm>
+          <a:prstGeom prst="rect">
+            <a:avLst/>
+          </a:prstGeom>
+        </p:spPr>
+      </p:pic>
+      <p:pic>
+        <p:nvPicPr>
+          <p:cNvPr id="9" name="Picture 8">
+            <a:extLst>
+              <a:ext uri="{FF2B5EF4-FFF2-40B4-BE49-F238E27FC236}">
+                <a16:creationId xmlns:a16="http://schemas.microsoft.com/office/drawing/2014/main" id="{A69DCD7F-3478-83A3-3E5E-5BA4C57C8D27}"/>
+              </a:ext>
+            </a:extLst>
+          </p:cNvPr>
+          <p:cNvPicPr>
+            <a:picLocks noChangeAspect="1"/>
+          </p:cNvPicPr>
+          <p:nvPr/>
+        </p:nvPicPr>
+        <p:blipFill>
+          <a:blip r:embed="rId4"/>
+          <a:stretch>
+            <a:fillRect/>
+          </a:stretch>
+        </p:blipFill>
+        <p:spPr>
+          <a:xfrm>
+            <a:off x="6167121" y="3154008"/>
+            <a:ext cx="2905760" cy="3338867"/>
+          </a:xfrm>
+          <a:prstGeom prst="rect">
+            <a:avLst/>
+          </a:prstGeom>
+        </p:spPr>
+      </p:pic>
+    </p:spTree>
+    <p:extLst>
+      <p:ext uri="{BB962C8B-B14F-4D97-AF65-F5344CB8AC3E}">
+        <p14:creationId xmlns:p14="http://schemas.microsoft.com/office/powerpoint/2010/main" val="3127115136"/>
+      </p:ext>
+    </p:extLst>
+  </p:cSld>
+  <p:clrMapOvr>
+    <a:masterClrMapping/>
+  </p:clrMapOvr>
+</p:sld>
+</file>
+
+<file path=ppt/slides/slide11.xml><?xml version="1.0" encoding="utf-8"?>
+<p:sld xmlns:a="http://schemas.openxmlformats.org/drawingml/2006/main" xmlns:r="http://schemas.openxmlformats.org/officeDocument/2006/relationships" xmlns:p="http://schemas.openxmlformats.org/presentationml/2006/main">
+  <p:cSld>
+    <p:spTree>
+      <p:nvGrpSpPr>
+        <p:cNvPr id="1" name=""/>
+        <p:cNvGrpSpPr/>
+        <p:nvPr/>
+      </p:nvGrpSpPr>
+      <p:grpSpPr>
+        <a:xfrm>
+          <a:off x="0" y="0"/>
+          <a:ext cx="0" cy="0"/>
+          <a:chOff x="0" y="0"/>
+          <a:chExt cx="0" cy="0"/>
+        </a:xfrm>
+      </p:grpSpPr>
+      <p:sp>
+        <p:nvSpPr>
+          <p:cNvPr id="2" name="Title 1">
+            <a:extLst>
+              <a:ext uri="{FF2B5EF4-FFF2-40B4-BE49-F238E27FC236}">
+                <a16:creationId xmlns:a16="http://schemas.microsoft.com/office/drawing/2014/main" id="{AD644F73-C8FD-A582-4BF0-C242210F3390}"/>
+              </a:ext>
+            </a:extLst>
+          </p:cNvPr>
+          <p:cNvSpPr>
+            <a:spLocks noGrp="1"/>
+          </p:cNvSpPr>
+          <p:nvPr>
+            <p:ph type="title"/>
+          </p:nvPr>
+        </p:nvSpPr>
+        <p:spPr/>
+        <p:txBody>
+          <a:bodyPr/>
+          <a:lstStyle/>
+          <a:p>
+            <a:r>
+              <a:rPr lang="en-US" dirty="0"/>
+              <a:t>Make New Drawing</a:t>
+            </a:r>
+          </a:p>
+        </p:txBody>
+      </p:sp>
+      <p:sp>
+        <p:nvSpPr>
+          <p:cNvPr id="3" name="Content Placeholder 2">
+            <a:extLst>
+              <a:ext uri="{FF2B5EF4-FFF2-40B4-BE49-F238E27FC236}">
+                <a16:creationId xmlns:a16="http://schemas.microsoft.com/office/drawing/2014/main" id="{E1282C81-B7A0-361A-49A8-C3AEAA9217CC}"/>
+              </a:ext>
+            </a:extLst>
+          </p:cNvPr>
+          <p:cNvSpPr>
+            <a:spLocks noGrp="1"/>
+          </p:cNvSpPr>
+          <p:nvPr>
+            <p:ph idx="1"/>
+          </p:nvPr>
+        </p:nvSpPr>
+        <p:spPr>
+          <a:xfrm>
+            <a:off x="838200" y="1825625"/>
+            <a:ext cx="5938520" cy="4351338"/>
+          </a:xfrm>
+        </p:spPr>
+        <p:txBody>
+          <a:bodyPr>
+            <a:normAutofit/>
+          </a:bodyPr>
+          <a:lstStyle/>
+          <a:p>
+            <a:r>
+              <a:rPr lang="en-US" sz="2000" dirty="0"/>
+              <a:t>Load part you want to make a drawing of</a:t>
+            </a:r>
+          </a:p>
+          <a:p>
+            <a:r>
+              <a:rPr lang="en-US" sz="2000" dirty="0"/>
+              <a:t>Make new drawing file: file-&gt;new</a:t>
+            </a:r>
+          </a:p>
+          <a:p>
+            <a:r>
+              <a:rPr lang="en-US" sz="2000" dirty="0"/>
+              <a:t>Set type to drawing and sheet size to blank</a:t>
+            </a:r>
+          </a:p>
+          <a:p>
+            <a:r>
+              <a:rPr lang="en-US" sz="2000" dirty="0"/>
+              <a:t>Click OK to make new file</a:t>
+            </a:r>
+          </a:p>
+        </p:txBody>
+      </p:sp>
+      <p:pic>
+        <p:nvPicPr>
+          <p:cNvPr id="5" name="Picture 4">
+            <a:extLst>
+              <a:ext uri="{FF2B5EF4-FFF2-40B4-BE49-F238E27FC236}">
+                <a16:creationId xmlns:a16="http://schemas.microsoft.com/office/drawing/2014/main" id="{D22C608E-F32A-F5FE-D4D0-19DE8AB6BBE3}"/>
+              </a:ext>
+            </a:extLst>
+          </p:cNvPr>
+          <p:cNvPicPr>
+            <a:picLocks noChangeAspect="1"/>
+          </p:cNvPicPr>
+          <p:nvPr/>
+        </p:nvPicPr>
+        <p:blipFill>
+          <a:blip r:embed="rId2"/>
+          <a:stretch>
+            <a:fillRect/>
+          </a:stretch>
+        </p:blipFill>
+        <p:spPr>
+          <a:xfrm>
+            <a:off x="7457480" y="1940559"/>
+            <a:ext cx="4409399" cy="3902075"/>
+          </a:xfrm>
+          <a:prstGeom prst="rect">
+            <a:avLst/>
+          </a:prstGeom>
+        </p:spPr>
+      </p:pic>
+    </p:spTree>
+    <p:extLst>
+      <p:ext uri="{BB962C8B-B14F-4D97-AF65-F5344CB8AC3E}">
+        <p14:creationId xmlns:p14="http://schemas.microsoft.com/office/powerpoint/2010/main" val="3708502569"/>
+      </p:ext>
+    </p:extLst>
+  </p:cSld>
+  <p:clrMapOvr>
+    <a:masterClrMapping/>
+  </p:clrMapOvr>
+</p:sld>
+</file>
+
+<file path=ppt/slides/slide12.xml><?xml version="1.0" encoding="utf-8"?>
+<p:sld xmlns:a="http://schemas.openxmlformats.org/drawingml/2006/main" xmlns:r="http://schemas.openxmlformats.org/officeDocument/2006/relationships" xmlns:p="http://schemas.openxmlformats.org/presentationml/2006/main">
+  <p:cSld>
+    <p:spTree>
+      <p:nvGrpSpPr>
+        <p:cNvPr id="1" name=""/>
+        <p:cNvGrpSpPr/>
+        <p:nvPr/>
+      </p:nvGrpSpPr>
+      <p:grpSpPr>
+        <a:xfrm>
+          <a:off x="0" y="0"/>
+          <a:ext cx="0" cy="0"/>
+          <a:chOff x="0" y="0"/>
+          <a:chExt cx="0" cy="0"/>
+        </a:xfrm>
+      </p:grpSpPr>
+      <p:sp>
+        <p:nvSpPr>
+          <p:cNvPr id="2" name="Title 1">
+            <a:extLst>
+              <a:ext uri="{FF2B5EF4-FFF2-40B4-BE49-F238E27FC236}">
+                <a16:creationId xmlns:a16="http://schemas.microsoft.com/office/drawing/2014/main" id="{A1895A06-4710-4F85-ACBB-9D65CF6AA128}"/>
+              </a:ext>
+            </a:extLst>
+          </p:cNvPr>
+          <p:cNvSpPr>
+            <a:spLocks noGrp="1"/>
+          </p:cNvSpPr>
+          <p:nvPr>
+            <p:ph type="title"/>
+          </p:nvPr>
+        </p:nvSpPr>
+        <p:spPr/>
+        <p:txBody>
+          <a:bodyPr/>
+          <a:lstStyle/>
+          <a:p>
+            <a:r>
+              <a:rPr lang="en-US" dirty="0"/>
+              <a:t>Set Up Drawing</a:t>
+            </a:r>
+          </a:p>
+        </p:txBody>
+      </p:sp>
+      <p:sp>
+        <p:nvSpPr>
+          <p:cNvPr id="3" name="Content Placeholder 2">
+            <a:extLst>
+              <a:ext uri="{FF2B5EF4-FFF2-40B4-BE49-F238E27FC236}">
+                <a16:creationId xmlns:a16="http://schemas.microsoft.com/office/drawing/2014/main" id="{E51EAE9F-1E39-A390-3B54-824184A719B7}"/>
+              </a:ext>
+            </a:extLst>
+          </p:cNvPr>
+          <p:cNvSpPr>
+            <a:spLocks noGrp="1"/>
+          </p:cNvSpPr>
+          <p:nvPr>
+            <p:ph idx="1"/>
+          </p:nvPr>
+        </p:nvSpPr>
+        <p:spPr/>
+        <p:txBody>
+          <a:bodyPr/>
+          <a:lstStyle/>
+          <a:p>
+            <a:r>
+              <a:rPr lang="en-US" dirty="0"/>
+              <a:t>You’ll be prompted to pick a sheet size</a:t>
+            </a:r>
+          </a:p>
+          <a:p>
+            <a:pPr lvl="1"/>
+            <a:r>
+              <a:rPr lang="en-US" dirty="0"/>
+              <a:t>Use template-&gt;TWOCAN_TEMPLATE</a:t>
+            </a:r>
+          </a:p>
+          <a:p>
+            <a:endParaRPr lang="en-US" dirty="0"/>
+          </a:p>
+          <a:p>
+            <a:r>
+              <a:rPr lang="en-US" dirty="0"/>
+              <a:t>The title block exists in layer 256, which is hidden</a:t>
+            </a:r>
+          </a:p>
+          <a:p>
+            <a:pPr lvl="1"/>
+            <a:r>
+              <a:rPr lang="en-US" dirty="0"/>
+              <a:t>Go to view-&gt; layer settings</a:t>
+            </a:r>
+          </a:p>
+          <a:p>
+            <a:pPr lvl="1"/>
+            <a:r>
+              <a:rPr lang="en-US" dirty="0"/>
+              <a:t>Check box to activate layer 256</a:t>
+            </a:r>
+          </a:p>
+        </p:txBody>
+      </p:sp>
+      <p:pic>
+        <p:nvPicPr>
+          <p:cNvPr id="7" name="Picture 6">
+            <a:extLst>
+              <a:ext uri="{FF2B5EF4-FFF2-40B4-BE49-F238E27FC236}">
+                <a16:creationId xmlns:a16="http://schemas.microsoft.com/office/drawing/2014/main" id="{E594D3E4-DB96-13E6-E295-8E078522FFFF}"/>
+              </a:ext>
+            </a:extLst>
+          </p:cNvPr>
+          <p:cNvPicPr>
+            <a:picLocks noChangeAspect="1"/>
+          </p:cNvPicPr>
+          <p:nvPr/>
+        </p:nvPicPr>
+        <p:blipFill>
+          <a:blip r:embed="rId2"/>
+          <a:stretch>
+            <a:fillRect/>
+          </a:stretch>
+        </p:blipFill>
+        <p:spPr>
+          <a:xfrm>
+            <a:off x="9245600" y="197309"/>
+            <a:ext cx="2398530" cy="3625685"/>
+          </a:xfrm>
+          <a:prstGeom prst="rect">
+            <a:avLst/>
+          </a:prstGeom>
+        </p:spPr>
+      </p:pic>
+      <p:pic>
+        <p:nvPicPr>
+          <p:cNvPr id="11" name="Picture 10">
+            <a:extLst>
+              <a:ext uri="{FF2B5EF4-FFF2-40B4-BE49-F238E27FC236}">
+                <a16:creationId xmlns:a16="http://schemas.microsoft.com/office/drawing/2014/main" id="{4B81649F-1C4A-1124-7F8D-DB390EC9CC9C}"/>
+              </a:ext>
+            </a:extLst>
+          </p:cNvPr>
+          <p:cNvPicPr>
+            <a:picLocks noChangeAspect="1"/>
+          </p:cNvPicPr>
+          <p:nvPr/>
+        </p:nvPicPr>
+        <p:blipFill>
+          <a:blip r:embed="rId3"/>
+          <a:stretch>
+            <a:fillRect/>
+          </a:stretch>
+        </p:blipFill>
+        <p:spPr>
+          <a:xfrm>
+            <a:off x="8444560" y="3957931"/>
+            <a:ext cx="3296110" cy="1476581"/>
+          </a:xfrm>
+          <a:prstGeom prst="rect">
+            <a:avLst/>
+          </a:prstGeom>
+        </p:spPr>
+      </p:pic>
+      <p:pic>
+        <p:nvPicPr>
+          <p:cNvPr id="13" name="Picture 12">
+            <a:extLst>
+              <a:ext uri="{FF2B5EF4-FFF2-40B4-BE49-F238E27FC236}">
+                <a16:creationId xmlns:a16="http://schemas.microsoft.com/office/drawing/2014/main" id="{27C48087-8FBA-6472-CF78-6907EA2B62B3}"/>
+              </a:ext>
+            </a:extLst>
+          </p:cNvPr>
+          <p:cNvPicPr>
+            <a:picLocks noChangeAspect="1"/>
+          </p:cNvPicPr>
+          <p:nvPr/>
+        </p:nvPicPr>
+        <p:blipFill>
+          <a:blip r:embed="rId4"/>
+          <a:stretch>
+            <a:fillRect/>
+          </a:stretch>
+        </p:blipFill>
+        <p:spPr>
+          <a:xfrm>
+            <a:off x="5876790" y="4231942"/>
+            <a:ext cx="2348560" cy="2547380"/>
+          </a:xfrm>
+          <a:prstGeom prst="rect">
+            <a:avLst/>
+          </a:prstGeom>
+        </p:spPr>
+      </p:pic>
+    </p:spTree>
+    <p:extLst>
+      <p:ext uri="{BB962C8B-B14F-4D97-AF65-F5344CB8AC3E}">
+        <p14:creationId xmlns:p14="http://schemas.microsoft.com/office/powerpoint/2010/main" val="3513834203"/>
+      </p:ext>
+    </p:extLst>
+  </p:cSld>
+  <p:clrMapOvr>
+    <a:masterClrMapping/>
+  </p:clrMapOvr>
+</p:sld>
+</file>
+
+<file path=ppt/slides/slide13.xml><?xml version="1.0" encoding="utf-8"?>
+<p:sld xmlns:a="http://schemas.openxmlformats.org/drawingml/2006/main" xmlns:r="http://schemas.openxmlformats.org/officeDocument/2006/relationships" xmlns:p="http://schemas.openxmlformats.org/presentationml/2006/main">
+  <p:cSld>
+    <p:spTree>
+      <p:nvGrpSpPr>
+        <p:cNvPr id="1" name=""/>
+        <p:cNvGrpSpPr/>
+        <p:nvPr/>
+      </p:nvGrpSpPr>
+      <p:grpSpPr>
+        <a:xfrm>
+          <a:off x="0" y="0"/>
+          <a:ext cx="0" cy="0"/>
+          <a:chOff x="0" y="0"/>
+          <a:chExt cx="0" cy="0"/>
+        </a:xfrm>
+      </p:grpSpPr>
+      <p:sp>
+        <p:nvSpPr>
+          <p:cNvPr id="2" name="Title 1">
+            <a:extLst>
+              <a:ext uri="{FF2B5EF4-FFF2-40B4-BE49-F238E27FC236}">
+                <a16:creationId xmlns:a16="http://schemas.microsoft.com/office/drawing/2014/main" id="{1FF3650A-BF6F-E59C-5D23-F428162CDEF3}"/>
+              </a:ext>
+            </a:extLst>
+          </p:cNvPr>
+          <p:cNvSpPr>
+            <a:spLocks noGrp="1"/>
+          </p:cNvSpPr>
+          <p:nvPr>
+            <p:ph type="title"/>
+          </p:nvPr>
+        </p:nvSpPr>
+        <p:spPr/>
+        <p:txBody>
+          <a:bodyPr/>
+          <a:lstStyle/>
+          <a:p>
+            <a:r>
+              <a:rPr lang="en-US" dirty="0"/>
+              <a:t>Fill out title block</a:t>
+            </a:r>
+          </a:p>
+        </p:txBody>
+      </p:sp>
+      <p:sp>
+        <p:nvSpPr>
+          <p:cNvPr id="3" name="Content Placeholder 2">
+            <a:extLst>
+              <a:ext uri="{FF2B5EF4-FFF2-40B4-BE49-F238E27FC236}">
+                <a16:creationId xmlns:a16="http://schemas.microsoft.com/office/drawing/2014/main" id="{8B29CE69-3CEE-C083-3010-5AD995AA9CE0}"/>
+              </a:ext>
+            </a:extLst>
+          </p:cNvPr>
+          <p:cNvSpPr>
+            <a:spLocks noGrp="1"/>
+          </p:cNvSpPr>
+          <p:nvPr>
+            <p:ph idx="1"/>
+          </p:nvPr>
+        </p:nvSpPr>
+        <p:spPr/>
+        <p:txBody>
+          <a:bodyPr>
+            <a:normAutofit/>
+          </a:bodyPr>
+          <a:lstStyle/>
+          <a:p>
+            <a:r>
+              <a:rPr lang="en-US" sz="2000" dirty="0"/>
+              <a:t>Drafting Tools -&gt; Populate title block</a:t>
+            </a:r>
+          </a:p>
+          <a:p>
+            <a:r>
+              <a:rPr lang="en-US" sz="2000" dirty="0"/>
+              <a:t>Fill out ENGINEER, DRAWN BY (you) and (MATERIAL</a:t>
+            </a:r>
+          </a:p>
+          <a:p>
+            <a:pPr lvl="1"/>
+            <a:r>
+              <a:rPr lang="en-US" sz="1800" dirty="0"/>
+              <a:t>Use “M. LEWTON” or “B. LAMARCA” format for names</a:t>
+            </a:r>
+          </a:p>
+        </p:txBody>
+      </p:sp>
+      <p:pic>
+        <p:nvPicPr>
+          <p:cNvPr id="5" name="Picture 4">
+            <a:extLst>
+              <a:ext uri="{FF2B5EF4-FFF2-40B4-BE49-F238E27FC236}">
+                <a16:creationId xmlns:a16="http://schemas.microsoft.com/office/drawing/2014/main" id="{EF1EABE6-513C-F692-F0C5-51E0C39F724E}"/>
+              </a:ext>
+            </a:extLst>
+          </p:cNvPr>
+          <p:cNvPicPr>
+            <a:picLocks noChangeAspect="1"/>
+          </p:cNvPicPr>
+          <p:nvPr/>
+        </p:nvPicPr>
+        <p:blipFill>
+          <a:blip r:embed="rId2"/>
+          <a:stretch>
+            <a:fillRect/>
+          </a:stretch>
+        </p:blipFill>
+        <p:spPr>
+          <a:xfrm>
+            <a:off x="7335259" y="758338"/>
+            <a:ext cx="4208553" cy="1501222"/>
+          </a:xfrm>
+          <a:prstGeom prst="rect">
+            <a:avLst/>
+          </a:prstGeom>
+        </p:spPr>
+      </p:pic>
+      <p:pic>
+        <p:nvPicPr>
+          <p:cNvPr id="7" name="Picture 6">
+            <a:extLst>
+              <a:ext uri="{FF2B5EF4-FFF2-40B4-BE49-F238E27FC236}">
+                <a16:creationId xmlns:a16="http://schemas.microsoft.com/office/drawing/2014/main" id="{3C511FE8-0A42-CC30-DA49-B1F5CB5B2253}"/>
+              </a:ext>
+            </a:extLst>
+          </p:cNvPr>
+          <p:cNvPicPr>
+            <a:picLocks noChangeAspect="1"/>
+          </p:cNvPicPr>
+          <p:nvPr/>
+        </p:nvPicPr>
+        <p:blipFill>
+          <a:blip r:embed="rId3"/>
+          <a:stretch>
+            <a:fillRect/>
+          </a:stretch>
+        </p:blipFill>
+        <p:spPr>
+          <a:xfrm>
+            <a:off x="7594277" y="2673831"/>
+            <a:ext cx="4040724" cy="3425831"/>
+          </a:xfrm>
+          <a:prstGeom prst="rect">
+            <a:avLst/>
+          </a:prstGeom>
+        </p:spPr>
+      </p:pic>
+    </p:spTree>
+    <p:extLst>
+      <p:ext uri="{BB962C8B-B14F-4D97-AF65-F5344CB8AC3E}">
+        <p14:creationId xmlns:p14="http://schemas.microsoft.com/office/powerpoint/2010/main" val="2214417505"/>
+      </p:ext>
+    </p:extLst>
+  </p:cSld>
+  <p:clrMapOvr>
+    <a:masterClrMapping/>
+  </p:clrMapOvr>
+</p:sld>
+</file>
+
 <file path=ppt/slides/slide2.xml><?xml version="1.0" encoding="utf-8"?>
 <p:sld xmlns:a="http://schemas.openxmlformats.org/drawingml/2006/main" xmlns:r="http://schemas.openxmlformats.org/officeDocument/2006/relationships" xmlns:p="http://schemas.openxmlformats.org/presentationml/2006/main">
   <p:cSld>
@@ -4788,7 +6065,12 @@
             <p:ph type="title"/>
           </p:nvPr>
         </p:nvSpPr>
-        <p:spPr/>
+        <p:spPr>
+          <a:xfrm>
+            <a:off x="315060" y="162737"/>
+            <a:ext cx="10515600" cy="1325563"/>
+          </a:xfrm>
+        </p:spPr>
         <p:txBody>
           <a:bodyPr/>
           <a:lstStyle/>
@@ -4814,7 +6096,7 @@
         </p:nvSpPr>
         <p:spPr>
           <a:xfrm>
-            <a:off x="3148541" y="1601260"/>
+            <a:off x="4871834" y="1399037"/>
             <a:ext cx="1604436" cy="634999"/>
           </a:xfrm>
           <a:prstGeom prst="rect">
@@ -4868,8 +6150,8 @@
         </p:nvSpPr>
         <p:spPr>
           <a:xfrm>
-            <a:off x="2120901" y="2682875"/>
-            <a:ext cx="1604434" cy="634999"/>
+            <a:off x="1723293" y="2458424"/>
+            <a:ext cx="2260599" cy="634999"/>
           </a:xfrm>
           <a:prstGeom prst="rect">
             <a:avLst/>
@@ -4903,7 +6185,7 @@
             <a:pPr algn="ctr"/>
             <a:r>
               <a:rPr lang="en-US" dirty="0"/>
-              <a:t>SUB LAYOUT</a:t>
+              <a:t>SUB ASSY 1 LAYOUT</a:t>
             </a:r>
           </a:p>
         </p:txBody>
@@ -4922,8 +6204,8 @@
         </p:nvSpPr>
         <p:spPr>
           <a:xfrm>
-            <a:off x="4176183" y="2682875"/>
-            <a:ext cx="1604434" cy="634999"/>
+            <a:off x="4543752" y="2468581"/>
+            <a:ext cx="2260599" cy="634999"/>
           </a:xfrm>
           <a:prstGeom prst="rect">
             <a:avLst/>
@@ -4957,7 +6239,7 @@
             <a:pPr algn="ctr"/>
             <a:r>
               <a:rPr lang="en-US" dirty="0"/>
-              <a:t>SUB LAYOUT</a:t>
+              <a:t>SUB ASSY 2 LAYOUT</a:t>
             </a:r>
           </a:p>
         </p:txBody>
@@ -4976,7 +6258,7 @@
         </p:nvSpPr>
         <p:spPr>
           <a:xfrm>
-            <a:off x="2120901" y="3774016"/>
+            <a:off x="776490" y="3585462"/>
             <a:ext cx="1604434" cy="634999"/>
           </a:xfrm>
           <a:prstGeom prst="rect">
@@ -5004,24 +6286,24 @@
             <a:pPr algn="ctr"/>
             <a:r>
               <a:rPr lang="en-US" dirty="0"/>
-              <a:t>C101-00X </a:t>
+              <a:t>C101-001 </a:t>
             </a:r>
           </a:p>
           <a:p>
             <a:pPr algn="ctr"/>
             <a:r>
               <a:rPr lang="en-US" dirty="0"/>
-              <a:t>PART X</a:t>
-            </a:r>
-          </a:p>
-        </p:txBody>
-      </p:sp>
-      <p:sp>
-        <p:nvSpPr>
-          <p:cNvPr id="8" name="Rectangle 7">
-            <a:extLst>
-              <a:ext uri="{FF2B5EF4-FFF2-40B4-BE49-F238E27FC236}">
-                <a16:creationId xmlns:a16="http://schemas.microsoft.com/office/drawing/2014/main" id="{940EECA6-481E-FC52-9004-F3E03174D3A4}"/>
+              <a:t>SUB 1PART 1</a:t>
+            </a:r>
+          </a:p>
+        </p:txBody>
+      </p:sp>
+      <p:sp>
+        <p:nvSpPr>
+          <p:cNvPr id="9" name="Rectangle 8">
+            <a:extLst>
+              <a:ext uri="{FF2B5EF4-FFF2-40B4-BE49-F238E27FC236}">
+                <a16:creationId xmlns:a16="http://schemas.microsoft.com/office/drawing/2014/main" id="{B2136903-1AED-79C8-7096-7DD7E161357A}"/>
               </a:ext>
             </a:extLst>
           </p:cNvPr>
@@ -5030,8 +6312,8 @@
         </p:nvSpPr>
         <p:spPr>
           <a:xfrm>
-            <a:off x="4176183" y="3774016"/>
-            <a:ext cx="1604434" cy="634999"/>
+            <a:off x="1895801" y="4496157"/>
+            <a:ext cx="1915582" cy="968367"/>
           </a:xfrm>
           <a:prstGeom prst="rect">
             <a:avLst/>
@@ -5058,24 +6340,31 @@
             <a:pPr algn="ctr"/>
             <a:r>
               <a:rPr lang="en-US" dirty="0"/>
-              <a:t>C102-00X </a:t>
+              <a:t>C101-501 </a:t>
             </a:r>
           </a:p>
           <a:p>
             <a:pPr algn="ctr"/>
             <a:r>
               <a:rPr lang="en-US" dirty="0"/>
-              <a:t>PART X</a:t>
-            </a:r>
-          </a:p>
-        </p:txBody>
-      </p:sp>
-      <p:sp>
-        <p:nvSpPr>
-          <p:cNvPr id="9" name="Rectangle 8">
-            <a:extLst>
-              <a:ext uri="{FF2B5EF4-FFF2-40B4-BE49-F238E27FC236}">
-                <a16:creationId xmlns:a16="http://schemas.microsoft.com/office/drawing/2014/main" id="{B2136903-1AED-79C8-7096-7DD7E161357A}"/>
+              <a:t>SUB ASSY 1 </a:t>
+            </a:r>
+          </a:p>
+          <a:p>
+            <a:pPr algn="ctr"/>
+            <a:r>
+              <a:rPr lang="en-US" dirty="0"/>
+              <a:t>ASSEMBLY FILE</a:t>
+            </a:r>
+          </a:p>
+        </p:txBody>
+      </p:sp>
+      <p:sp>
+        <p:nvSpPr>
+          <p:cNvPr id="11" name="Rectangle 10">
+            <a:extLst>
+              <a:ext uri="{FF2B5EF4-FFF2-40B4-BE49-F238E27FC236}">
+                <a16:creationId xmlns:a16="http://schemas.microsoft.com/office/drawing/2014/main" id="{F1533725-D914-1F7B-40CB-7D47A41E5D22}"/>
               </a:ext>
             </a:extLst>
           </p:cNvPr>
@@ -5084,8 +6373,8 @@
         </p:nvSpPr>
         <p:spPr>
           <a:xfrm>
-            <a:off x="2000250" y="4756147"/>
-            <a:ext cx="1845735" cy="634999"/>
+            <a:off x="4693462" y="6000716"/>
+            <a:ext cx="2519322" cy="634999"/>
           </a:xfrm>
           <a:prstGeom prst="rect">
             <a:avLst/>
@@ -5112,24 +6401,24 @@
             <a:pPr algn="ctr"/>
             <a:r>
               <a:rPr lang="en-US" dirty="0"/>
-              <a:t>C101-501 </a:t>
+              <a:t>C100-501 </a:t>
             </a:r>
           </a:p>
           <a:p>
             <a:pPr algn="ctr"/>
             <a:r>
               <a:rPr lang="en-US" dirty="0"/>
-              <a:t>SUB ASSEMBLY</a:t>
-            </a:r>
-          </a:p>
-        </p:txBody>
-      </p:sp>
-      <p:sp>
-        <p:nvSpPr>
-          <p:cNvPr id="11" name="Rectangle 10">
-            <a:extLst>
-              <a:ext uri="{FF2B5EF4-FFF2-40B4-BE49-F238E27FC236}">
-                <a16:creationId xmlns:a16="http://schemas.microsoft.com/office/drawing/2014/main" id="{F1533725-D914-1F7B-40CB-7D47A41E5D22}"/>
+              <a:t>TOP LEVEL ASSEMBLY</a:t>
+            </a:r>
+          </a:p>
+        </p:txBody>
+      </p:sp>
+      <p:sp>
+        <p:nvSpPr>
+          <p:cNvPr id="12" name="Rectangle 11">
+            <a:extLst>
+              <a:ext uri="{FF2B5EF4-FFF2-40B4-BE49-F238E27FC236}">
+                <a16:creationId xmlns:a16="http://schemas.microsoft.com/office/drawing/2014/main" id="{B63E8682-5E39-00F2-3238-C1F068096955}"/>
               </a:ext>
             </a:extLst>
           </p:cNvPr>
@@ -5138,8 +6427,8 @@
         </p:nvSpPr>
         <p:spPr>
           <a:xfrm>
-            <a:off x="2923117" y="5875168"/>
-            <a:ext cx="2055284" cy="634999"/>
+            <a:off x="4885758" y="4576103"/>
+            <a:ext cx="1845735" cy="634999"/>
           </a:xfrm>
           <a:prstGeom prst="rect">
             <a:avLst/>
@@ -5166,60 +6455,6 @@
             <a:pPr algn="ctr"/>
             <a:r>
               <a:rPr lang="en-US" dirty="0"/>
-              <a:t>C100-501 </a:t>
-            </a:r>
-          </a:p>
-          <a:p>
-            <a:pPr algn="ctr"/>
-            <a:r>
-              <a:rPr lang="en-US" dirty="0"/>
-              <a:t>TOP ASSEMBLY</a:t>
-            </a:r>
-          </a:p>
-        </p:txBody>
-      </p:sp>
-      <p:sp>
-        <p:nvSpPr>
-          <p:cNvPr id="12" name="Rectangle 11">
-            <a:extLst>
-              <a:ext uri="{FF2B5EF4-FFF2-40B4-BE49-F238E27FC236}">
-                <a16:creationId xmlns:a16="http://schemas.microsoft.com/office/drawing/2014/main" id="{B63E8682-5E39-00F2-3238-C1F068096955}"/>
-              </a:ext>
-            </a:extLst>
-          </p:cNvPr>
-          <p:cNvSpPr/>
-          <p:nvPr/>
-        </p:nvSpPr>
-        <p:spPr>
-          <a:xfrm>
-            <a:off x="4055532" y="4754395"/>
-            <a:ext cx="1845735" cy="634999"/>
-          </a:xfrm>
-          <a:prstGeom prst="rect">
-            <a:avLst/>
-          </a:prstGeom>
-        </p:spPr>
-        <p:style>
-          <a:lnRef idx="2">
-            <a:schemeClr val="accent6"/>
-          </a:lnRef>
-          <a:fillRef idx="1">
-            <a:schemeClr val="lt1"/>
-          </a:fillRef>
-          <a:effectRef idx="0">
-            <a:schemeClr val="accent6"/>
-          </a:effectRef>
-          <a:fontRef idx="minor">
-            <a:schemeClr val="dk1"/>
-          </a:fontRef>
-        </p:style>
-        <p:txBody>
-          <a:bodyPr rtlCol="0" anchor="ctr"/>
-          <a:lstStyle/>
-          <a:p>
-            <a:pPr algn="ctr"/>
-            <a:r>
-              <a:rPr lang="en-US" dirty="0"/>
               <a:t>C101-501 </a:t>
             </a:r>
           </a:p>
@@ -5250,226 +6485,10 @@
         </p:nvCxnSpPr>
         <p:spPr>
           <a:xfrm rot="5400000">
-            <a:off x="3213631" y="1945747"/>
-            <a:ext cx="446616" cy="1027641"/>
+            <a:off x="4051629" y="836001"/>
+            <a:ext cx="424388" cy="2820459"/>
           </a:xfrm>
           <a:prstGeom prst="bentConnector3">
-            <a:avLst/>
-          </a:prstGeom>
-          <a:ln>
-            <a:tailEnd type="triangle"/>
-          </a:ln>
-        </p:spPr>
-        <p:style>
-          <a:lnRef idx="2">
-            <a:schemeClr val="accent1"/>
-          </a:lnRef>
-          <a:fillRef idx="0">
-            <a:schemeClr val="accent1"/>
-          </a:fillRef>
-          <a:effectRef idx="1">
-            <a:schemeClr val="accent1"/>
-          </a:effectRef>
-          <a:fontRef idx="minor">
-            <a:schemeClr val="tx1"/>
-          </a:fontRef>
-        </p:style>
-      </p:cxnSp>
-      <p:cxnSp>
-        <p:nvCxnSpPr>
-          <p:cNvPr id="15" name="Connector: Elbow 14">
-            <a:extLst>
-              <a:ext uri="{FF2B5EF4-FFF2-40B4-BE49-F238E27FC236}">
-                <a16:creationId xmlns:a16="http://schemas.microsoft.com/office/drawing/2014/main" id="{72E204F0-C179-3BBB-FE57-6E07C827B546}"/>
-              </a:ext>
-            </a:extLst>
-          </p:cNvPr>
-          <p:cNvCxnSpPr>
-            <a:cxnSpLocks/>
-            <a:stCxn id="4" idx="2"/>
-            <a:endCxn id="6" idx="0"/>
-          </p:cNvCxnSpPr>
-          <p:nvPr/>
-        </p:nvCxnSpPr>
-        <p:spPr>
-          <a:xfrm rot="16200000" flipH="1">
-            <a:off x="4241271" y="1945746"/>
-            <a:ext cx="446616" cy="1027641"/>
-          </a:xfrm>
-          <a:prstGeom prst="bentConnector3">
-            <a:avLst>
-              <a:gd name="adj1" fmla="val 50000"/>
-            </a:avLst>
-          </a:prstGeom>
-          <a:ln>
-            <a:tailEnd type="triangle"/>
-          </a:ln>
-        </p:spPr>
-        <p:style>
-          <a:lnRef idx="2">
-            <a:schemeClr val="accent1"/>
-          </a:lnRef>
-          <a:fillRef idx="0">
-            <a:schemeClr val="accent1"/>
-          </a:fillRef>
-          <a:effectRef idx="1">
-            <a:schemeClr val="accent1"/>
-          </a:effectRef>
-          <a:fontRef idx="minor">
-            <a:schemeClr val="tx1"/>
-          </a:fontRef>
-        </p:style>
-      </p:cxnSp>
-      <p:cxnSp>
-        <p:nvCxnSpPr>
-          <p:cNvPr id="19" name="Straight Arrow Connector 18">
-            <a:extLst>
-              <a:ext uri="{FF2B5EF4-FFF2-40B4-BE49-F238E27FC236}">
-                <a16:creationId xmlns:a16="http://schemas.microsoft.com/office/drawing/2014/main" id="{F0237989-57A7-8B98-36F7-05581CCB9978}"/>
-              </a:ext>
-            </a:extLst>
-          </p:cNvPr>
-          <p:cNvCxnSpPr>
-            <a:stCxn id="5" idx="2"/>
-            <a:endCxn id="7" idx="0"/>
-          </p:cNvCxnSpPr>
-          <p:nvPr/>
-        </p:nvCxnSpPr>
-        <p:spPr>
-          <a:xfrm>
-            <a:off x="2923118" y="3317874"/>
-            <a:ext cx="0" cy="456142"/>
-          </a:xfrm>
-          <a:prstGeom prst="straightConnector1">
-            <a:avLst/>
-          </a:prstGeom>
-          <a:ln>
-            <a:tailEnd type="triangle"/>
-          </a:ln>
-        </p:spPr>
-        <p:style>
-          <a:lnRef idx="2">
-            <a:schemeClr val="accent1"/>
-          </a:lnRef>
-          <a:fillRef idx="0">
-            <a:schemeClr val="accent1"/>
-          </a:fillRef>
-          <a:effectRef idx="1">
-            <a:schemeClr val="accent1"/>
-          </a:effectRef>
-          <a:fontRef idx="minor">
-            <a:schemeClr val="tx1"/>
-          </a:fontRef>
-        </p:style>
-      </p:cxnSp>
-      <p:cxnSp>
-        <p:nvCxnSpPr>
-          <p:cNvPr id="20" name="Straight Arrow Connector 19">
-            <a:extLst>
-              <a:ext uri="{FF2B5EF4-FFF2-40B4-BE49-F238E27FC236}">
-                <a16:creationId xmlns:a16="http://schemas.microsoft.com/office/drawing/2014/main" id="{BE2D93A2-5DD4-9E35-14F6-C3F5EE536DBB}"/>
-              </a:ext>
-            </a:extLst>
-          </p:cNvPr>
-          <p:cNvCxnSpPr>
-            <a:cxnSpLocks/>
-            <a:stCxn id="7" idx="2"/>
-            <a:endCxn id="9" idx="0"/>
-          </p:cNvCxnSpPr>
-          <p:nvPr/>
-        </p:nvCxnSpPr>
-        <p:spPr>
-          <a:xfrm>
-            <a:off x="2923118" y="4409015"/>
-            <a:ext cx="0" cy="347132"/>
-          </a:xfrm>
-          <a:prstGeom prst="straightConnector1">
-            <a:avLst/>
-          </a:prstGeom>
-          <a:ln>
-            <a:tailEnd type="triangle"/>
-          </a:ln>
-        </p:spPr>
-        <p:style>
-          <a:lnRef idx="2">
-            <a:schemeClr val="accent1"/>
-          </a:lnRef>
-          <a:fillRef idx="0">
-            <a:schemeClr val="accent1"/>
-          </a:fillRef>
-          <a:effectRef idx="1">
-            <a:schemeClr val="accent1"/>
-          </a:effectRef>
-          <a:fontRef idx="minor">
-            <a:schemeClr val="tx1"/>
-          </a:fontRef>
-        </p:style>
-      </p:cxnSp>
-      <p:cxnSp>
-        <p:nvCxnSpPr>
-          <p:cNvPr id="23" name="Straight Arrow Connector 22">
-            <a:extLst>
-              <a:ext uri="{FF2B5EF4-FFF2-40B4-BE49-F238E27FC236}">
-                <a16:creationId xmlns:a16="http://schemas.microsoft.com/office/drawing/2014/main" id="{A1B7E087-E659-C328-A2B4-8B8E198D8A17}"/>
-              </a:ext>
-            </a:extLst>
-          </p:cNvPr>
-          <p:cNvCxnSpPr>
-            <a:cxnSpLocks/>
-            <a:stCxn id="6" idx="2"/>
-            <a:endCxn id="8" idx="0"/>
-          </p:cNvCxnSpPr>
-          <p:nvPr/>
-        </p:nvCxnSpPr>
-        <p:spPr>
-          <a:xfrm>
-            <a:off x="4978400" y="3317874"/>
-            <a:ext cx="0" cy="456142"/>
-          </a:xfrm>
-          <a:prstGeom prst="straightConnector1">
-            <a:avLst/>
-          </a:prstGeom>
-          <a:ln>
-            <a:tailEnd type="triangle"/>
-          </a:ln>
-        </p:spPr>
-        <p:style>
-          <a:lnRef idx="2">
-            <a:schemeClr val="accent1"/>
-          </a:lnRef>
-          <a:fillRef idx="0">
-            <a:schemeClr val="accent1"/>
-          </a:fillRef>
-          <a:effectRef idx="1">
-            <a:schemeClr val="accent1"/>
-          </a:effectRef>
-          <a:fontRef idx="minor">
-            <a:schemeClr val="tx1"/>
-          </a:fontRef>
-        </p:style>
-      </p:cxnSp>
-      <p:cxnSp>
-        <p:nvCxnSpPr>
-          <p:cNvPr id="26" name="Straight Arrow Connector 25">
-            <a:extLst>
-              <a:ext uri="{FF2B5EF4-FFF2-40B4-BE49-F238E27FC236}">
-                <a16:creationId xmlns:a16="http://schemas.microsoft.com/office/drawing/2014/main" id="{FE071CFB-9082-1C09-1B5A-106303207A08}"/>
-              </a:ext>
-            </a:extLst>
-          </p:cNvPr>
-          <p:cNvCxnSpPr>
-            <a:cxnSpLocks/>
-            <a:stCxn id="8" idx="2"/>
-            <a:endCxn id="12" idx="0"/>
-          </p:cNvCxnSpPr>
-          <p:nvPr/>
-        </p:nvCxnSpPr>
-        <p:spPr>
-          <a:xfrm>
-            <a:off x="4978400" y="4409015"/>
-            <a:ext cx="0" cy="345380"/>
-          </a:xfrm>
-          <a:prstGeom prst="straightConnector1">
             <a:avLst/>
           </a:prstGeom>
           <a:ln>
@@ -5508,9 +6527,9 @@
           <p:nvPr/>
         </p:nvCxnSpPr>
         <p:spPr>
-          <a:xfrm rot="5400000">
-            <a:off x="4221693" y="5118461"/>
-            <a:ext cx="485774" cy="1027641"/>
+          <a:xfrm rot="16200000" flipH="1">
+            <a:off x="5486067" y="5533660"/>
+            <a:ext cx="789614" cy="144497"/>
           </a:xfrm>
           <a:prstGeom prst="bentConnector3">
             <a:avLst>
@@ -5554,13 +6573,594 @@
         </p:nvCxnSpPr>
         <p:spPr>
           <a:xfrm rot="16200000" flipH="1">
-            <a:off x="3194927" y="5119336"/>
-            <a:ext cx="484022" cy="1027641"/>
+            <a:off x="4135261" y="4182854"/>
+            <a:ext cx="536192" cy="3099531"/>
           </a:xfrm>
           <a:prstGeom prst="bentConnector3">
             <a:avLst>
               <a:gd name="adj1" fmla="val 50000"/>
             </a:avLst>
+          </a:prstGeom>
+          <a:ln>
+            <a:tailEnd type="triangle"/>
+          </a:ln>
+        </p:spPr>
+        <p:style>
+          <a:lnRef idx="2">
+            <a:schemeClr val="accent1"/>
+          </a:lnRef>
+          <a:fillRef idx="0">
+            <a:schemeClr val="accent1"/>
+          </a:fillRef>
+          <a:effectRef idx="1">
+            <a:schemeClr val="accent1"/>
+          </a:effectRef>
+          <a:fontRef idx="minor">
+            <a:schemeClr val="tx1"/>
+          </a:fontRef>
+        </p:style>
+      </p:cxnSp>
+      <p:sp>
+        <p:nvSpPr>
+          <p:cNvPr id="41" name="Rectangle 40">
+            <a:extLst>
+              <a:ext uri="{FF2B5EF4-FFF2-40B4-BE49-F238E27FC236}">
+                <a16:creationId xmlns:a16="http://schemas.microsoft.com/office/drawing/2014/main" id="{DABEAA95-F19D-9D4C-7166-B81AE4B440F3}"/>
+              </a:ext>
+            </a:extLst>
+          </p:cNvPr>
+          <p:cNvSpPr/>
+          <p:nvPr/>
+        </p:nvSpPr>
+        <p:spPr>
+          <a:xfrm>
+            <a:off x="8898144" y="2458422"/>
+            <a:ext cx="2260599" cy="634999"/>
+          </a:xfrm>
+          <a:prstGeom prst="rect">
+            <a:avLst/>
+          </a:prstGeom>
+        </p:spPr>
+        <p:style>
+          <a:lnRef idx="2">
+            <a:schemeClr val="accent6"/>
+          </a:lnRef>
+          <a:fillRef idx="1">
+            <a:schemeClr val="lt1"/>
+          </a:fillRef>
+          <a:effectRef idx="0">
+            <a:schemeClr val="accent6"/>
+          </a:effectRef>
+          <a:fontRef idx="minor">
+            <a:schemeClr val="dk1"/>
+          </a:fontRef>
+        </p:style>
+        <p:txBody>
+          <a:bodyPr rtlCol="0" anchor="ctr"/>
+          <a:lstStyle/>
+          <a:p>
+            <a:pPr algn="ctr"/>
+            <a:r>
+              <a:rPr lang="en-US" dirty="0"/>
+              <a:t>C10X-000 </a:t>
+            </a:r>
+          </a:p>
+          <a:p>
+            <a:pPr algn="ctr"/>
+            <a:r>
+              <a:rPr lang="en-US" dirty="0"/>
+              <a:t>SUB ASSY X LAYOUT</a:t>
+            </a:r>
+          </a:p>
+        </p:txBody>
+      </p:sp>
+      <p:cxnSp>
+        <p:nvCxnSpPr>
+          <p:cNvPr id="43" name="Connector: Elbow 42">
+            <a:extLst>
+              <a:ext uri="{FF2B5EF4-FFF2-40B4-BE49-F238E27FC236}">
+                <a16:creationId xmlns:a16="http://schemas.microsoft.com/office/drawing/2014/main" id="{2B7B632B-39F0-D1B2-49D3-B120E967406F}"/>
+              </a:ext>
+            </a:extLst>
+          </p:cNvPr>
+          <p:cNvCxnSpPr>
+            <a:cxnSpLocks/>
+            <a:stCxn id="4" idx="2"/>
+            <a:endCxn id="41" idx="0"/>
+          </p:cNvCxnSpPr>
+          <p:nvPr/>
+        </p:nvCxnSpPr>
+        <p:spPr>
+          <a:xfrm rot="16200000" flipH="1">
+            <a:off x="7639055" y="69033"/>
+            <a:ext cx="424386" cy="4354392"/>
+          </a:xfrm>
+          <a:prstGeom prst="bentConnector3">
+            <a:avLst>
+              <a:gd name="adj1" fmla="val 50000"/>
+            </a:avLst>
+          </a:prstGeom>
+          <a:ln>
+            <a:tailEnd type="triangle"/>
+          </a:ln>
+        </p:spPr>
+        <p:style>
+          <a:lnRef idx="2">
+            <a:schemeClr val="accent1"/>
+          </a:lnRef>
+          <a:fillRef idx="0">
+            <a:schemeClr val="accent1"/>
+          </a:fillRef>
+          <a:effectRef idx="1">
+            <a:schemeClr val="accent1"/>
+          </a:effectRef>
+          <a:fontRef idx="minor">
+            <a:schemeClr val="tx1"/>
+          </a:fontRef>
+        </p:style>
+      </p:cxnSp>
+      <p:cxnSp>
+        <p:nvCxnSpPr>
+          <p:cNvPr id="46" name="Straight Arrow Connector 45">
+            <a:extLst>
+              <a:ext uri="{FF2B5EF4-FFF2-40B4-BE49-F238E27FC236}">
+                <a16:creationId xmlns:a16="http://schemas.microsoft.com/office/drawing/2014/main" id="{027EB594-EAA3-15FA-A07F-4638F756F3A1}"/>
+              </a:ext>
+            </a:extLst>
+          </p:cNvPr>
+          <p:cNvCxnSpPr>
+            <a:cxnSpLocks/>
+            <a:stCxn id="4" idx="2"/>
+            <a:endCxn id="6" idx="0"/>
+          </p:cNvCxnSpPr>
+          <p:nvPr/>
+        </p:nvCxnSpPr>
+        <p:spPr>
+          <a:xfrm>
+            <a:off x="5674052" y="2034036"/>
+            <a:ext cx="0" cy="434545"/>
+          </a:xfrm>
+          <a:prstGeom prst="straightConnector1">
+            <a:avLst/>
+          </a:prstGeom>
+          <a:ln>
+            <a:tailEnd type="triangle"/>
+          </a:ln>
+        </p:spPr>
+        <p:style>
+          <a:lnRef idx="2">
+            <a:schemeClr val="accent1"/>
+          </a:lnRef>
+          <a:fillRef idx="0">
+            <a:schemeClr val="accent1"/>
+          </a:fillRef>
+          <a:effectRef idx="1">
+            <a:schemeClr val="accent1"/>
+          </a:effectRef>
+          <a:fontRef idx="minor">
+            <a:schemeClr val="tx1"/>
+          </a:fontRef>
+        </p:style>
+      </p:cxnSp>
+      <p:cxnSp>
+        <p:nvCxnSpPr>
+          <p:cNvPr id="53" name="Connector: Elbow 52">
+            <a:extLst>
+              <a:ext uri="{FF2B5EF4-FFF2-40B4-BE49-F238E27FC236}">
+                <a16:creationId xmlns:a16="http://schemas.microsoft.com/office/drawing/2014/main" id="{7082AB91-887B-1E9F-97F4-DC5054C4ED58}"/>
+              </a:ext>
+            </a:extLst>
+          </p:cNvPr>
+          <p:cNvCxnSpPr>
+            <a:cxnSpLocks/>
+            <a:stCxn id="5" idx="2"/>
+            <a:endCxn id="7" idx="0"/>
+          </p:cNvCxnSpPr>
+          <p:nvPr/>
+        </p:nvCxnSpPr>
+        <p:spPr>
+          <a:xfrm rot="5400000">
+            <a:off x="1970131" y="2701999"/>
+            <a:ext cx="492039" cy="1274886"/>
+          </a:xfrm>
+          <a:prstGeom prst="bentConnector3">
+            <a:avLst>
+              <a:gd name="adj1" fmla="val 50000"/>
+            </a:avLst>
+          </a:prstGeom>
+          <a:ln>
+            <a:tailEnd type="triangle"/>
+          </a:ln>
+        </p:spPr>
+        <p:style>
+          <a:lnRef idx="2">
+            <a:schemeClr val="accent1"/>
+          </a:lnRef>
+          <a:fillRef idx="0">
+            <a:schemeClr val="accent1"/>
+          </a:fillRef>
+          <a:effectRef idx="1">
+            <a:schemeClr val="accent1"/>
+          </a:effectRef>
+          <a:fontRef idx="minor">
+            <a:schemeClr val="tx1"/>
+          </a:fontRef>
+        </p:style>
+      </p:cxnSp>
+      <p:sp>
+        <p:nvSpPr>
+          <p:cNvPr id="58" name="Rectangle 57">
+            <a:extLst>
+              <a:ext uri="{FF2B5EF4-FFF2-40B4-BE49-F238E27FC236}">
+                <a16:creationId xmlns:a16="http://schemas.microsoft.com/office/drawing/2014/main" id="{DF794CEC-77A9-D75A-1D41-2471139DC52F}"/>
+              </a:ext>
+            </a:extLst>
+          </p:cNvPr>
+          <p:cNvSpPr/>
+          <p:nvPr/>
+        </p:nvSpPr>
+        <p:spPr>
+          <a:xfrm>
+            <a:off x="2535765" y="3581454"/>
+            <a:ext cx="1604434" cy="634999"/>
+          </a:xfrm>
+          <a:prstGeom prst="rect">
+            <a:avLst/>
+          </a:prstGeom>
+        </p:spPr>
+        <p:style>
+          <a:lnRef idx="2">
+            <a:schemeClr val="accent6"/>
+          </a:lnRef>
+          <a:fillRef idx="1">
+            <a:schemeClr val="lt1"/>
+          </a:fillRef>
+          <a:effectRef idx="0">
+            <a:schemeClr val="accent6"/>
+          </a:effectRef>
+          <a:fontRef idx="minor">
+            <a:schemeClr val="dk1"/>
+          </a:fontRef>
+        </p:style>
+        <p:txBody>
+          <a:bodyPr rtlCol="0" anchor="ctr"/>
+          <a:lstStyle/>
+          <a:p>
+            <a:pPr algn="ctr"/>
+            <a:r>
+              <a:rPr lang="en-US" dirty="0"/>
+              <a:t>C101-00X </a:t>
+            </a:r>
+          </a:p>
+          <a:p>
+            <a:pPr algn="ctr"/>
+            <a:r>
+              <a:rPr lang="en-US" dirty="0"/>
+              <a:t>SUB 1PART X</a:t>
+            </a:r>
+          </a:p>
+        </p:txBody>
+      </p:sp>
+      <p:cxnSp>
+        <p:nvCxnSpPr>
+          <p:cNvPr id="61" name="Connector: Elbow 60">
+            <a:extLst>
+              <a:ext uri="{FF2B5EF4-FFF2-40B4-BE49-F238E27FC236}">
+                <a16:creationId xmlns:a16="http://schemas.microsoft.com/office/drawing/2014/main" id="{8270A24C-9D0A-ACE0-B77F-5474B147983A}"/>
+              </a:ext>
+            </a:extLst>
+          </p:cNvPr>
+          <p:cNvCxnSpPr>
+            <a:cxnSpLocks/>
+            <a:stCxn id="5" idx="2"/>
+            <a:endCxn id="58" idx="0"/>
+          </p:cNvCxnSpPr>
+          <p:nvPr/>
+        </p:nvCxnSpPr>
+        <p:spPr>
+          <a:xfrm rot="16200000" flipH="1">
+            <a:off x="2851772" y="3095243"/>
+            <a:ext cx="488031" cy="484389"/>
+          </a:xfrm>
+          <a:prstGeom prst="bentConnector3">
+            <a:avLst>
+              <a:gd name="adj1" fmla="val 50000"/>
+            </a:avLst>
+          </a:prstGeom>
+          <a:ln>
+            <a:tailEnd type="triangle"/>
+          </a:ln>
+        </p:spPr>
+        <p:style>
+          <a:lnRef idx="2">
+            <a:schemeClr val="accent1"/>
+          </a:lnRef>
+          <a:fillRef idx="0">
+            <a:schemeClr val="accent1"/>
+          </a:fillRef>
+          <a:effectRef idx="1">
+            <a:schemeClr val="accent1"/>
+          </a:effectRef>
+          <a:fontRef idx="minor">
+            <a:schemeClr val="tx1"/>
+          </a:fontRef>
+        </p:style>
+      </p:cxnSp>
+      <p:sp>
+        <p:nvSpPr>
+          <p:cNvPr id="67" name="Rectangle 66">
+            <a:extLst>
+              <a:ext uri="{FF2B5EF4-FFF2-40B4-BE49-F238E27FC236}">
+                <a16:creationId xmlns:a16="http://schemas.microsoft.com/office/drawing/2014/main" id="{958ACC3C-BA73-4FB0-F500-A5A4537A4B00}"/>
+              </a:ext>
+            </a:extLst>
+          </p:cNvPr>
+          <p:cNvSpPr/>
+          <p:nvPr/>
+        </p:nvSpPr>
+        <p:spPr>
+          <a:xfrm>
+            <a:off x="9226226" y="3473846"/>
+            <a:ext cx="1604434" cy="634999"/>
+          </a:xfrm>
+          <a:prstGeom prst="rect">
+            <a:avLst/>
+          </a:prstGeom>
+        </p:spPr>
+        <p:style>
+          <a:lnRef idx="2">
+            <a:schemeClr val="accent6"/>
+          </a:lnRef>
+          <a:fillRef idx="1">
+            <a:schemeClr val="lt1"/>
+          </a:fillRef>
+          <a:effectRef idx="0">
+            <a:schemeClr val="accent6"/>
+          </a:effectRef>
+          <a:fontRef idx="minor">
+            <a:schemeClr val="dk1"/>
+          </a:fontRef>
+        </p:style>
+        <p:txBody>
+          <a:bodyPr rtlCol="0" anchor="ctr"/>
+          <a:lstStyle/>
+          <a:p>
+            <a:pPr algn="ctr"/>
+            <a:r>
+              <a:rPr lang="en-US" dirty="0"/>
+              <a:t>C10X-00Y </a:t>
+            </a:r>
+          </a:p>
+          <a:p>
+            <a:pPr algn="ctr"/>
+            <a:r>
+              <a:rPr lang="en-US" dirty="0"/>
+              <a:t>PART Y</a:t>
+            </a:r>
+          </a:p>
+        </p:txBody>
+      </p:sp>
+      <p:sp>
+        <p:nvSpPr>
+          <p:cNvPr id="70" name="Rectangle 69">
+            <a:extLst>
+              <a:ext uri="{FF2B5EF4-FFF2-40B4-BE49-F238E27FC236}">
+                <a16:creationId xmlns:a16="http://schemas.microsoft.com/office/drawing/2014/main" id="{BDDFAD53-5E51-4834-A3B4-10F015559EB3}"/>
+              </a:ext>
+            </a:extLst>
+          </p:cNvPr>
+          <p:cNvSpPr/>
+          <p:nvPr/>
+        </p:nvSpPr>
+        <p:spPr>
+          <a:xfrm>
+            <a:off x="4348689" y="3579702"/>
+            <a:ext cx="1604434" cy="634999"/>
+          </a:xfrm>
+          <a:prstGeom prst="rect">
+            <a:avLst/>
+          </a:prstGeom>
+        </p:spPr>
+        <p:style>
+          <a:lnRef idx="2">
+            <a:schemeClr val="accent6"/>
+          </a:lnRef>
+          <a:fillRef idx="1">
+            <a:schemeClr val="lt1"/>
+          </a:fillRef>
+          <a:effectRef idx="0">
+            <a:schemeClr val="accent6"/>
+          </a:effectRef>
+          <a:fontRef idx="minor">
+            <a:schemeClr val="dk1"/>
+          </a:fontRef>
+        </p:style>
+        <p:txBody>
+          <a:bodyPr rtlCol="0" anchor="ctr"/>
+          <a:lstStyle/>
+          <a:p>
+            <a:pPr algn="ctr"/>
+            <a:r>
+              <a:rPr lang="en-US" dirty="0"/>
+              <a:t>C101-001 </a:t>
+            </a:r>
+          </a:p>
+          <a:p>
+            <a:pPr algn="ctr"/>
+            <a:r>
+              <a:rPr lang="en-US" dirty="0"/>
+              <a:t>SUB 1PART 1</a:t>
+            </a:r>
+          </a:p>
+        </p:txBody>
+      </p:sp>
+      <p:cxnSp>
+        <p:nvCxnSpPr>
+          <p:cNvPr id="71" name="Connector: Elbow 70">
+            <a:extLst>
+              <a:ext uri="{FF2B5EF4-FFF2-40B4-BE49-F238E27FC236}">
+                <a16:creationId xmlns:a16="http://schemas.microsoft.com/office/drawing/2014/main" id="{98B56634-F815-377E-4696-8D2596A19226}"/>
+              </a:ext>
+            </a:extLst>
+          </p:cNvPr>
+          <p:cNvCxnSpPr>
+            <a:cxnSpLocks/>
+            <a:stCxn id="6" idx="2"/>
+            <a:endCxn id="70" idx="0"/>
+          </p:cNvCxnSpPr>
+          <p:nvPr/>
+        </p:nvCxnSpPr>
+        <p:spPr>
+          <a:xfrm rot="5400000">
+            <a:off x="5174418" y="3080068"/>
+            <a:ext cx="476122" cy="523146"/>
+          </a:xfrm>
+          <a:prstGeom prst="bentConnector3">
+            <a:avLst>
+              <a:gd name="adj1" fmla="val 50000"/>
+            </a:avLst>
+          </a:prstGeom>
+          <a:ln>
+            <a:tailEnd type="triangle"/>
+          </a:ln>
+        </p:spPr>
+        <p:style>
+          <a:lnRef idx="2">
+            <a:schemeClr val="accent1"/>
+          </a:lnRef>
+          <a:fillRef idx="0">
+            <a:schemeClr val="accent1"/>
+          </a:fillRef>
+          <a:effectRef idx="1">
+            <a:schemeClr val="accent1"/>
+          </a:effectRef>
+          <a:fontRef idx="minor">
+            <a:schemeClr val="tx1"/>
+          </a:fontRef>
+        </p:style>
+      </p:cxnSp>
+      <p:sp>
+        <p:nvSpPr>
+          <p:cNvPr id="72" name="Rectangle 71">
+            <a:extLst>
+              <a:ext uri="{FF2B5EF4-FFF2-40B4-BE49-F238E27FC236}">
+                <a16:creationId xmlns:a16="http://schemas.microsoft.com/office/drawing/2014/main" id="{A9404193-86F5-1DE2-F192-A3259CC55E18}"/>
+              </a:ext>
+            </a:extLst>
+          </p:cNvPr>
+          <p:cNvSpPr/>
+          <p:nvPr/>
+        </p:nvSpPr>
+        <p:spPr>
+          <a:xfrm>
+            <a:off x="6107964" y="3575694"/>
+            <a:ext cx="1604434" cy="634999"/>
+          </a:xfrm>
+          <a:prstGeom prst="rect">
+            <a:avLst/>
+          </a:prstGeom>
+        </p:spPr>
+        <p:style>
+          <a:lnRef idx="2">
+            <a:schemeClr val="accent6"/>
+          </a:lnRef>
+          <a:fillRef idx="1">
+            <a:schemeClr val="lt1"/>
+          </a:fillRef>
+          <a:effectRef idx="0">
+            <a:schemeClr val="accent6"/>
+          </a:effectRef>
+          <a:fontRef idx="minor">
+            <a:schemeClr val="dk1"/>
+          </a:fontRef>
+        </p:style>
+        <p:txBody>
+          <a:bodyPr rtlCol="0" anchor="ctr"/>
+          <a:lstStyle/>
+          <a:p>
+            <a:pPr algn="ctr"/>
+            <a:r>
+              <a:rPr lang="en-US" dirty="0"/>
+              <a:t>C101-00X </a:t>
+            </a:r>
+          </a:p>
+          <a:p>
+            <a:pPr algn="ctr"/>
+            <a:r>
+              <a:rPr lang="en-US" dirty="0"/>
+              <a:t>SUB 1PART X</a:t>
+            </a:r>
+          </a:p>
+        </p:txBody>
+      </p:sp>
+      <p:cxnSp>
+        <p:nvCxnSpPr>
+          <p:cNvPr id="73" name="Connector: Elbow 72">
+            <a:extLst>
+              <a:ext uri="{FF2B5EF4-FFF2-40B4-BE49-F238E27FC236}">
+                <a16:creationId xmlns:a16="http://schemas.microsoft.com/office/drawing/2014/main" id="{81E887F2-E3A0-0007-6766-8CB41C80874A}"/>
+              </a:ext>
+            </a:extLst>
+          </p:cNvPr>
+          <p:cNvCxnSpPr>
+            <a:cxnSpLocks/>
+            <a:stCxn id="6" idx="2"/>
+            <a:endCxn id="72" idx="0"/>
+          </p:cNvCxnSpPr>
+          <p:nvPr/>
+        </p:nvCxnSpPr>
+        <p:spPr>
+          <a:xfrm rot="16200000" flipH="1">
+            <a:off x="6056059" y="2721572"/>
+            <a:ext cx="472114" cy="1236129"/>
+          </a:xfrm>
+          <a:prstGeom prst="bentConnector3">
+            <a:avLst>
+              <a:gd name="adj1" fmla="val 50000"/>
+            </a:avLst>
+          </a:prstGeom>
+          <a:ln>
+            <a:tailEnd type="triangle"/>
+          </a:ln>
+        </p:spPr>
+        <p:style>
+          <a:lnRef idx="2">
+            <a:schemeClr val="accent1"/>
+          </a:lnRef>
+          <a:fillRef idx="0">
+            <a:schemeClr val="accent1"/>
+          </a:fillRef>
+          <a:effectRef idx="1">
+            <a:schemeClr val="accent1"/>
+          </a:effectRef>
+          <a:fontRef idx="minor">
+            <a:schemeClr val="tx1"/>
+          </a:fontRef>
+        </p:style>
+      </p:cxnSp>
+      <p:cxnSp>
+        <p:nvCxnSpPr>
+          <p:cNvPr id="78" name="Straight Arrow Connector 77">
+            <a:extLst>
+              <a:ext uri="{FF2B5EF4-FFF2-40B4-BE49-F238E27FC236}">
+                <a16:creationId xmlns:a16="http://schemas.microsoft.com/office/drawing/2014/main" id="{CD2D7010-0681-42E6-9801-D56A6F945E7A}"/>
+              </a:ext>
+            </a:extLst>
+          </p:cNvPr>
+          <p:cNvCxnSpPr>
+            <a:cxnSpLocks/>
+            <a:stCxn id="41" idx="2"/>
+            <a:endCxn id="67" idx="0"/>
+          </p:cNvCxnSpPr>
+          <p:nvPr/>
+        </p:nvCxnSpPr>
+        <p:spPr>
+          <a:xfrm flipH="1">
+            <a:off x="10028443" y="3093421"/>
+            <a:ext cx="1" cy="380425"/>
+          </a:xfrm>
+          <a:prstGeom prst="straightConnector1">
+            <a:avLst/>
           </a:prstGeom>
           <a:ln>
             <a:tailEnd type="triangle"/>
@@ -5585,6 +7185,1647 @@
     <p:extLst>
       <p:ext uri="{BB962C8B-B14F-4D97-AF65-F5344CB8AC3E}">
         <p14:creationId xmlns:p14="http://schemas.microsoft.com/office/powerpoint/2010/main" val="3431940743"/>
+      </p:ext>
+    </p:extLst>
+  </p:cSld>
+  <p:clrMapOvr>
+    <a:masterClrMapping/>
+  </p:clrMapOvr>
+</p:sld>
+</file>
+
+<file path=ppt/slides/slide8.xml><?xml version="1.0" encoding="utf-8"?>
+<p:sld xmlns:a="http://schemas.openxmlformats.org/drawingml/2006/main" xmlns:r="http://schemas.openxmlformats.org/officeDocument/2006/relationships" xmlns:p="http://schemas.openxmlformats.org/presentationml/2006/main">
+  <p:cSld>
+    <p:spTree>
+      <p:nvGrpSpPr>
+        <p:cNvPr id="1" name="">
+          <a:extLst>
+            <a:ext uri="{FF2B5EF4-FFF2-40B4-BE49-F238E27FC236}">
+              <a16:creationId xmlns:a16="http://schemas.microsoft.com/office/drawing/2014/main" id="{A472AFA7-89ED-CC3C-6360-52890C1BB7E0}"/>
+            </a:ext>
+          </a:extLst>
+        </p:cNvPr>
+        <p:cNvGrpSpPr/>
+        <p:nvPr/>
+      </p:nvGrpSpPr>
+      <p:grpSpPr>
+        <a:xfrm>
+          <a:off x="0" y="0"/>
+          <a:ext cx="0" cy="0"/>
+          <a:chOff x="0" y="0"/>
+          <a:chExt cx="0" cy="0"/>
+        </a:xfrm>
+      </p:grpSpPr>
+      <p:sp>
+        <p:nvSpPr>
+          <p:cNvPr id="4" name="Rectangle 3">
+            <a:extLst>
+              <a:ext uri="{FF2B5EF4-FFF2-40B4-BE49-F238E27FC236}">
+                <a16:creationId xmlns:a16="http://schemas.microsoft.com/office/drawing/2014/main" id="{1CF05C7B-B346-4C02-6D5A-32EA4E72B28C}"/>
+              </a:ext>
+            </a:extLst>
+          </p:cNvPr>
+          <p:cNvSpPr/>
+          <p:nvPr/>
+        </p:nvSpPr>
+        <p:spPr>
+          <a:xfrm>
+            <a:off x="4787944" y="350413"/>
+            <a:ext cx="1604436" cy="634999"/>
+          </a:xfrm>
+          <a:prstGeom prst="rect">
+            <a:avLst/>
+          </a:prstGeom>
+        </p:spPr>
+        <p:style>
+          <a:lnRef idx="2">
+            <a:schemeClr val="accent6"/>
+          </a:lnRef>
+          <a:fillRef idx="1">
+            <a:schemeClr val="lt1"/>
+          </a:fillRef>
+          <a:effectRef idx="0">
+            <a:schemeClr val="accent6"/>
+          </a:effectRef>
+          <a:fontRef idx="minor">
+            <a:schemeClr val="dk1"/>
+          </a:fontRef>
+        </p:style>
+        <p:txBody>
+          <a:bodyPr rtlCol="0" anchor="ctr"/>
+          <a:lstStyle/>
+          <a:p>
+            <a:pPr algn="ctr"/>
+            <a:r>
+              <a:rPr lang="en-US" dirty="0"/>
+              <a:t>C100-000 </a:t>
+            </a:r>
+          </a:p>
+          <a:p>
+            <a:pPr algn="ctr"/>
+            <a:r>
+              <a:rPr lang="en-US" dirty="0"/>
+              <a:t>LAYOUT</a:t>
+            </a:r>
+          </a:p>
+        </p:txBody>
+      </p:sp>
+      <p:sp>
+        <p:nvSpPr>
+          <p:cNvPr id="5" name="Rectangle 4">
+            <a:extLst>
+              <a:ext uri="{FF2B5EF4-FFF2-40B4-BE49-F238E27FC236}">
+                <a16:creationId xmlns:a16="http://schemas.microsoft.com/office/drawing/2014/main" id="{4E230815-D000-E41B-358B-1817F1D55FFB}"/>
+              </a:ext>
+            </a:extLst>
+          </p:cNvPr>
+          <p:cNvSpPr/>
+          <p:nvPr/>
+        </p:nvSpPr>
+        <p:spPr>
+          <a:xfrm>
+            <a:off x="1639403" y="1409800"/>
+            <a:ext cx="2260599" cy="634999"/>
+          </a:xfrm>
+          <a:prstGeom prst="rect">
+            <a:avLst/>
+          </a:prstGeom>
+        </p:spPr>
+        <p:style>
+          <a:lnRef idx="2">
+            <a:schemeClr val="accent6"/>
+          </a:lnRef>
+          <a:fillRef idx="1">
+            <a:schemeClr val="lt1"/>
+          </a:fillRef>
+          <a:effectRef idx="0">
+            <a:schemeClr val="accent6"/>
+          </a:effectRef>
+          <a:fontRef idx="minor">
+            <a:schemeClr val="dk1"/>
+          </a:fontRef>
+        </p:style>
+        <p:txBody>
+          <a:bodyPr rtlCol="0" anchor="ctr"/>
+          <a:lstStyle/>
+          <a:p>
+            <a:pPr algn="ctr"/>
+            <a:r>
+              <a:rPr lang="en-US" dirty="0"/>
+              <a:t>C101-000</a:t>
+            </a:r>
+          </a:p>
+          <a:p>
+            <a:pPr algn="ctr"/>
+            <a:r>
+              <a:rPr lang="en-US" dirty="0"/>
+              <a:t>SUB ASSY 1 LAYOUT</a:t>
+            </a:r>
+          </a:p>
+        </p:txBody>
+      </p:sp>
+      <p:sp>
+        <p:nvSpPr>
+          <p:cNvPr id="6" name="Rectangle 5">
+            <a:extLst>
+              <a:ext uri="{FF2B5EF4-FFF2-40B4-BE49-F238E27FC236}">
+                <a16:creationId xmlns:a16="http://schemas.microsoft.com/office/drawing/2014/main" id="{D95F3386-693F-6BFD-8B14-E7F641DD8C27}"/>
+              </a:ext>
+            </a:extLst>
+          </p:cNvPr>
+          <p:cNvSpPr/>
+          <p:nvPr/>
+        </p:nvSpPr>
+        <p:spPr>
+          <a:xfrm>
+            <a:off x="4459862" y="1419957"/>
+            <a:ext cx="2260599" cy="634999"/>
+          </a:xfrm>
+          <a:prstGeom prst="rect">
+            <a:avLst/>
+          </a:prstGeom>
+        </p:spPr>
+        <p:style>
+          <a:lnRef idx="2">
+            <a:schemeClr val="accent6"/>
+          </a:lnRef>
+          <a:fillRef idx="1">
+            <a:schemeClr val="lt1"/>
+          </a:fillRef>
+          <a:effectRef idx="0">
+            <a:schemeClr val="accent6"/>
+          </a:effectRef>
+          <a:fontRef idx="minor">
+            <a:schemeClr val="dk1"/>
+          </a:fontRef>
+        </p:style>
+        <p:txBody>
+          <a:bodyPr rtlCol="0" anchor="ctr"/>
+          <a:lstStyle/>
+          <a:p>
+            <a:pPr algn="ctr"/>
+            <a:r>
+              <a:rPr lang="en-US" dirty="0"/>
+              <a:t>C102-000 </a:t>
+            </a:r>
+          </a:p>
+          <a:p>
+            <a:pPr algn="ctr"/>
+            <a:r>
+              <a:rPr lang="en-US" dirty="0"/>
+              <a:t>SUB ASSY 2 LAYOUT</a:t>
+            </a:r>
+          </a:p>
+        </p:txBody>
+      </p:sp>
+      <p:sp>
+        <p:nvSpPr>
+          <p:cNvPr id="7" name="Rectangle 6">
+            <a:extLst>
+              <a:ext uri="{FF2B5EF4-FFF2-40B4-BE49-F238E27FC236}">
+                <a16:creationId xmlns:a16="http://schemas.microsoft.com/office/drawing/2014/main" id="{20D4FDE6-E0F2-D1E0-BC91-C40361974D4E}"/>
+              </a:ext>
+            </a:extLst>
+          </p:cNvPr>
+          <p:cNvSpPr/>
+          <p:nvPr/>
+        </p:nvSpPr>
+        <p:spPr>
+          <a:xfrm>
+            <a:off x="692600" y="2536838"/>
+            <a:ext cx="1604434" cy="634999"/>
+          </a:xfrm>
+          <a:prstGeom prst="rect">
+            <a:avLst/>
+          </a:prstGeom>
+        </p:spPr>
+        <p:style>
+          <a:lnRef idx="2">
+            <a:schemeClr val="accent6"/>
+          </a:lnRef>
+          <a:fillRef idx="1">
+            <a:schemeClr val="lt1"/>
+          </a:fillRef>
+          <a:effectRef idx="0">
+            <a:schemeClr val="accent6"/>
+          </a:effectRef>
+          <a:fontRef idx="minor">
+            <a:schemeClr val="dk1"/>
+          </a:fontRef>
+        </p:style>
+        <p:txBody>
+          <a:bodyPr rtlCol="0" anchor="ctr"/>
+          <a:lstStyle/>
+          <a:p>
+            <a:pPr algn="ctr"/>
+            <a:r>
+              <a:rPr lang="en-US" dirty="0"/>
+              <a:t>C101-001 </a:t>
+            </a:r>
+          </a:p>
+          <a:p>
+            <a:pPr algn="ctr"/>
+            <a:r>
+              <a:rPr lang="en-US" dirty="0"/>
+              <a:t>SUB 1PART 1</a:t>
+            </a:r>
+          </a:p>
+        </p:txBody>
+      </p:sp>
+      <p:sp>
+        <p:nvSpPr>
+          <p:cNvPr id="9" name="Rectangle 8">
+            <a:extLst>
+              <a:ext uri="{FF2B5EF4-FFF2-40B4-BE49-F238E27FC236}">
+                <a16:creationId xmlns:a16="http://schemas.microsoft.com/office/drawing/2014/main" id="{CB9857A4-F595-5B93-C4CA-C71C8F8D1BDA}"/>
+              </a:ext>
+            </a:extLst>
+          </p:cNvPr>
+          <p:cNvSpPr/>
+          <p:nvPr/>
+        </p:nvSpPr>
+        <p:spPr>
+          <a:xfrm>
+            <a:off x="1811911" y="3663876"/>
+            <a:ext cx="1915582" cy="968367"/>
+          </a:xfrm>
+          <a:prstGeom prst="rect">
+            <a:avLst/>
+          </a:prstGeom>
+        </p:spPr>
+        <p:style>
+          <a:lnRef idx="2">
+            <a:schemeClr val="accent6"/>
+          </a:lnRef>
+          <a:fillRef idx="1">
+            <a:schemeClr val="lt1"/>
+          </a:fillRef>
+          <a:effectRef idx="0">
+            <a:schemeClr val="accent6"/>
+          </a:effectRef>
+          <a:fontRef idx="minor">
+            <a:schemeClr val="dk1"/>
+          </a:fontRef>
+        </p:style>
+        <p:txBody>
+          <a:bodyPr rtlCol="0" anchor="ctr"/>
+          <a:lstStyle/>
+          <a:p>
+            <a:pPr algn="ctr"/>
+            <a:r>
+              <a:rPr lang="en-US" dirty="0"/>
+              <a:t>C101-501 </a:t>
+            </a:r>
+          </a:p>
+          <a:p>
+            <a:pPr algn="ctr"/>
+            <a:r>
+              <a:rPr lang="en-US" dirty="0"/>
+              <a:t>SUB ASSY 1 </a:t>
+            </a:r>
+          </a:p>
+          <a:p>
+            <a:pPr algn="ctr"/>
+            <a:r>
+              <a:rPr lang="en-US" dirty="0"/>
+              <a:t>ASSEMBLY FILE</a:t>
+            </a:r>
+          </a:p>
+        </p:txBody>
+      </p:sp>
+      <p:sp>
+        <p:nvSpPr>
+          <p:cNvPr id="11" name="Rectangle 10">
+            <a:extLst>
+              <a:ext uri="{FF2B5EF4-FFF2-40B4-BE49-F238E27FC236}">
+                <a16:creationId xmlns:a16="http://schemas.microsoft.com/office/drawing/2014/main" id="{869FAF28-F748-95C5-F933-079BA839CFAD}"/>
+              </a:ext>
+            </a:extLst>
+          </p:cNvPr>
+          <p:cNvSpPr/>
+          <p:nvPr/>
+        </p:nvSpPr>
+        <p:spPr>
+          <a:xfrm>
+            <a:off x="4444786" y="5337985"/>
+            <a:ext cx="2290750" cy="968366"/>
+          </a:xfrm>
+          <a:prstGeom prst="rect">
+            <a:avLst/>
+          </a:prstGeom>
+        </p:spPr>
+        <p:style>
+          <a:lnRef idx="2">
+            <a:schemeClr val="accent6"/>
+          </a:lnRef>
+          <a:fillRef idx="1">
+            <a:schemeClr val="lt1"/>
+          </a:fillRef>
+          <a:effectRef idx="0">
+            <a:schemeClr val="accent6"/>
+          </a:effectRef>
+          <a:fontRef idx="minor">
+            <a:schemeClr val="dk1"/>
+          </a:fontRef>
+        </p:style>
+        <p:txBody>
+          <a:bodyPr rtlCol="0" anchor="ctr"/>
+          <a:lstStyle/>
+          <a:p>
+            <a:pPr algn="ctr"/>
+            <a:r>
+              <a:rPr lang="en-US" dirty="0"/>
+              <a:t>C100-501 </a:t>
+            </a:r>
+          </a:p>
+          <a:p>
+            <a:pPr algn="ctr"/>
+            <a:r>
+              <a:rPr lang="en-US" dirty="0"/>
+              <a:t>TOP LEVEL ASSEMBLY FILE</a:t>
+            </a:r>
+          </a:p>
+        </p:txBody>
+      </p:sp>
+      <p:cxnSp>
+        <p:nvCxnSpPr>
+          <p:cNvPr id="14" name="Connector: Elbow 13">
+            <a:extLst>
+              <a:ext uri="{FF2B5EF4-FFF2-40B4-BE49-F238E27FC236}">
+                <a16:creationId xmlns:a16="http://schemas.microsoft.com/office/drawing/2014/main" id="{6C313FE1-3EB9-5563-19FA-00B036B8035B}"/>
+              </a:ext>
+            </a:extLst>
+          </p:cNvPr>
+          <p:cNvCxnSpPr>
+            <a:cxnSpLocks/>
+            <a:stCxn id="4" idx="2"/>
+            <a:endCxn id="5" idx="0"/>
+          </p:cNvCxnSpPr>
+          <p:nvPr/>
+        </p:nvCxnSpPr>
+        <p:spPr>
+          <a:xfrm rot="5400000">
+            <a:off x="3967739" y="-212623"/>
+            <a:ext cx="424388" cy="2820459"/>
+          </a:xfrm>
+          <a:prstGeom prst="bentConnector3">
+            <a:avLst/>
+          </a:prstGeom>
+          <a:ln>
+            <a:tailEnd type="triangle"/>
+          </a:ln>
+        </p:spPr>
+        <p:style>
+          <a:lnRef idx="2">
+            <a:schemeClr val="accent1"/>
+          </a:lnRef>
+          <a:fillRef idx="0">
+            <a:schemeClr val="accent1"/>
+          </a:fillRef>
+          <a:effectRef idx="1">
+            <a:schemeClr val="accent1"/>
+          </a:effectRef>
+          <a:fontRef idx="minor">
+            <a:schemeClr val="tx1"/>
+          </a:fontRef>
+        </p:style>
+      </p:cxnSp>
+      <p:cxnSp>
+        <p:nvCxnSpPr>
+          <p:cNvPr id="32" name="Connector: Elbow 31">
+            <a:extLst>
+              <a:ext uri="{FF2B5EF4-FFF2-40B4-BE49-F238E27FC236}">
+                <a16:creationId xmlns:a16="http://schemas.microsoft.com/office/drawing/2014/main" id="{83FCBAC7-C67F-E157-19E2-FCE072974099}"/>
+              </a:ext>
+            </a:extLst>
+          </p:cNvPr>
+          <p:cNvCxnSpPr>
+            <a:cxnSpLocks/>
+            <a:stCxn id="9" idx="2"/>
+            <a:endCxn id="11" idx="0"/>
+          </p:cNvCxnSpPr>
+          <p:nvPr/>
+        </p:nvCxnSpPr>
+        <p:spPr>
+          <a:xfrm rot="16200000" flipH="1">
+            <a:off x="3827060" y="3574884"/>
+            <a:ext cx="705742" cy="2820459"/>
+          </a:xfrm>
+          <a:prstGeom prst="bentConnector3">
+            <a:avLst>
+              <a:gd name="adj1" fmla="val 50000"/>
+            </a:avLst>
+          </a:prstGeom>
+          <a:ln>
+            <a:tailEnd type="triangle"/>
+          </a:ln>
+        </p:spPr>
+        <p:style>
+          <a:lnRef idx="2">
+            <a:schemeClr val="accent1"/>
+          </a:lnRef>
+          <a:fillRef idx="0">
+            <a:schemeClr val="accent1"/>
+          </a:fillRef>
+          <a:effectRef idx="1">
+            <a:schemeClr val="accent1"/>
+          </a:effectRef>
+          <a:fontRef idx="minor">
+            <a:schemeClr val="tx1"/>
+          </a:fontRef>
+        </p:style>
+      </p:cxnSp>
+      <p:sp>
+        <p:nvSpPr>
+          <p:cNvPr id="41" name="Rectangle 40">
+            <a:extLst>
+              <a:ext uri="{FF2B5EF4-FFF2-40B4-BE49-F238E27FC236}">
+                <a16:creationId xmlns:a16="http://schemas.microsoft.com/office/drawing/2014/main" id="{34952384-ADCD-18F1-A48C-52C5FA22E70F}"/>
+              </a:ext>
+            </a:extLst>
+          </p:cNvPr>
+          <p:cNvSpPr/>
+          <p:nvPr/>
+        </p:nvSpPr>
+        <p:spPr>
+          <a:xfrm>
+            <a:off x="8386415" y="1409798"/>
+            <a:ext cx="2260599" cy="634999"/>
+          </a:xfrm>
+          <a:prstGeom prst="rect">
+            <a:avLst/>
+          </a:prstGeom>
+        </p:spPr>
+        <p:style>
+          <a:lnRef idx="2">
+            <a:schemeClr val="accent6"/>
+          </a:lnRef>
+          <a:fillRef idx="1">
+            <a:schemeClr val="lt1"/>
+          </a:fillRef>
+          <a:effectRef idx="0">
+            <a:schemeClr val="accent6"/>
+          </a:effectRef>
+          <a:fontRef idx="minor">
+            <a:schemeClr val="dk1"/>
+          </a:fontRef>
+        </p:style>
+        <p:txBody>
+          <a:bodyPr rtlCol="0" anchor="ctr"/>
+          <a:lstStyle/>
+          <a:p>
+            <a:pPr algn="ctr"/>
+            <a:r>
+              <a:rPr lang="en-US" dirty="0"/>
+              <a:t>C10X-000 </a:t>
+            </a:r>
+          </a:p>
+          <a:p>
+            <a:pPr algn="ctr"/>
+            <a:r>
+              <a:rPr lang="en-US" dirty="0"/>
+              <a:t>SUB ASSY X LAYOUT</a:t>
+            </a:r>
+          </a:p>
+        </p:txBody>
+      </p:sp>
+      <p:cxnSp>
+        <p:nvCxnSpPr>
+          <p:cNvPr id="43" name="Connector: Elbow 42">
+            <a:extLst>
+              <a:ext uri="{FF2B5EF4-FFF2-40B4-BE49-F238E27FC236}">
+                <a16:creationId xmlns:a16="http://schemas.microsoft.com/office/drawing/2014/main" id="{6BFF0225-3F24-24EF-02D4-7CEC16ED78AC}"/>
+              </a:ext>
+            </a:extLst>
+          </p:cNvPr>
+          <p:cNvCxnSpPr>
+            <a:cxnSpLocks/>
+            <a:stCxn id="4" idx="2"/>
+            <a:endCxn id="41" idx="0"/>
+          </p:cNvCxnSpPr>
+          <p:nvPr/>
+        </p:nvCxnSpPr>
+        <p:spPr>
+          <a:xfrm rot="16200000" flipH="1">
+            <a:off x="7341245" y="-765672"/>
+            <a:ext cx="424386" cy="3926553"/>
+          </a:xfrm>
+          <a:prstGeom prst="bentConnector3">
+            <a:avLst>
+              <a:gd name="adj1" fmla="val 50000"/>
+            </a:avLst>
+          </a:prstGeom>
+          <a:ln>
+            <a:tailEnd type="triangle"/>
+          </a:ln>
+        </p:spPr>
+        <p:style>
+          <a:lnRef idx="2">
+            <a:schemeClr val="accent1"/>
+          </a:lnRef>
+          <a:fillRef idx="0">
+            <a:schemeClr val="accent1"/>
+          </a:fillRef>
+          <a:effectRef idx="1">
+            <a:schemeClr val="accent1"/>
+          </a:effectRef>
+          <a:fontRef idx="minor">
+            <a:schemeClr val="tx1"/>
+          </a:fontRef>
+        </p:style>
+      </p:cxnSp>
+      <p:cxnSp>
+        <p:nvCxnSpPr>
+          <p:cNvPr id="46" name="Straight Arrow Connector 45">
+            <a:extLst>
+              <a:ext uri="{FF2B5EF4-FFF2-40B4-BE49-F238E27FC236}">
+                <a16:creationId xmlns:a16="http://schemas.microsoft.com/office/drawing/2014/main" id="{C05BF4DB-F011-29C7-9107-C07C2C769EBE}"/>
+              </a:ext>
+            </a:extLst>
+          </p:cNvPr>
+          <p:cNvCxnSpPr>
+            <a:cxnSpLocks/>
+            <a:stCxn id="4" idx="2"/>
+            <a:endCxn id="6" idx="0"/>
+          </p:cNvCxnSpPr>
+          <p:nvPr/>
+        </p:nvCxnSpPr>
+        <p:spPr>
+          <a:xfrm>
+            <a:off x="5590162" y="985412"/>
+            <a:ext cx="0" cy="434545"/>
+          </a:xfrm>
+          <a:prstGeom prst="straightConnector1">
+            <a:avLst/>
+          </a:prstGeom>
+          <a:ln>
+            <a:tailEnd type="triangle"/>
+          </a:ln>
+        </p:spPr>
+        <p:style>
+          <a:lnRef idx="2">
+            <a:schemeClr val="accent1"/>
+          </a:lnRef>
+          <a:fillRef idx="0">
+            <a:schemeClr val="accent1"/>
+          </a:fillRef>
+          <a:effectRef idx="1">
+            <a:schemeClr val="accent1"/>
+          </a:effectRef>
+          <a:fontRef idx="minor">
+            <a:schemeClr val="tx1"/>
+          </a:fontRef>
+        </p:style>
+      </p:cxnSp>
+      <p:cxnSp>
+        <p:nvCxnSpPr>
+          <p:cNvPr id="53" name="Connector: Elbow 52">
+            <a:extLst>
+              <a:ext uri="{FF2B5EF4-FFF2-40B4-BE49-F238E27FC236}">
+                <a16:creationId xmlns:a16="http://schemas.microsoft.com/office/drawing/2014/main" id="{D1420E77-2073-87A2-1214-D61BA38AC696}"/>
+              </a:ext>
+            </a:extLst>
+          </p:cNvPr>
+          <p:cNvCxnSpPr>
+            <a:cxnSpLocks/>
+            <a:stCxn id="5" idx="2"/>
+            <a:endCxn id="7" idx="0"/>
+          </p:cNvCxnSpPr>
+          <p:nvPr/>
+        </p:nvCxnSpPr>
+        <p:spPr>
+          <a:xfrm rot="5400000">
+            <a:off x="1886241" y="1653375"/>
+            <a:ext cx="492039" cy="1274886"/>
+          </a:xfrm>
+          <a:prstGeom prst="bentConnector3">
+            <a:avLst>
+              <a:gd name="adj1" fmla="val 50000"/>
+            </a:avLst>
+          </a:prstGeom>
+          <a:ln>
+            <a:tailEnd type="triangle"/>
+          </a:ln>
+        </p:spPr>
+        <p:style>
+          <a:lnRef idx="2">
+            <a:schemeClr val="accent1"/>
+          </a:lnRef>
+          <a:fillRef idx="0">
+            <a:schemeClr val="accent1"/>
+          </a:fillRef>
+          <a:effectRef idx="1">
+            <a:schemeClr val="accent1"/>
+          </a:effectRef>
+          <a:fontRef idx="minor">
+            <a:schemeClr val="tx1"/>
+          </a:fontRef>
+        </p:style>
+      </p:cxnSp>
+      <p:sp>
+        <p:nvSpPr>
+          <p:cNvPr id="58" name="Rectangle 57">
+            <a:extLst>
+              <a:ext uri="{FF2B5EF4-FFF2-40B4-BE49-F238E27FC236}">
+                <a16:creationId xmlns:a16="http://schemas.microsoft.com/office/drawing/2014/main" id="{15389DF8-1B5D-4FE6-9850-86AAF56FB845}"/>
+              </a:ext>
+            </a:extLst>
+          </p:cNvPr>
+          <p:cNvSpPr/>
+          <p:nvPr/>
+        </p:nvSpPr>
+        <p:spPr>
+          <a:xfrm>
+            <a:off x="2451875" y="2532830"/>
+            <a:ext cx="1604434" cy="634999"/>
+          </a:xfrm>
+          <a:prstGeom prst="rect">
+            <a:avLst/>
+          </a:prstGeom>
+        </p:spPr>
+        <p:style>
+          <a:lnRef idx="2">
+            <a:schemeClr val="accent6"/>
+          </a:lnRef>
+          <a:fillRef idx="1">
+            <a:schemeClr val="lt1"/>
+          </a:fillRef>
+          <a:effectRef idx="0">
+            <a:schemeClr val="accent6"/>
+          </a:effectRef>
+          <a:fontRef idx="minor">
+            <a:schemeClr val="dk1"/>
+          </a:fontRef>
+        </p:style>
+        <p:txBody>
+          <a:bodyPr rtlCol="0" anchor="ctr"/>
+          <a:lstStyle/>
+          <a:p>
+            <a:pPr algn="ctr"/>
+            <a:r>
+              <a:rPr lang="en-US" dirty="0"/>
+              <a:t>C101-00Y </a:t>
+            </a:r>
+          </a:p>
+          <a:p>
+            <a:pPr algn="ctr"/>
+            <a:r>
+              <a:rPr lang="en-US" dirty="0"/>
+              <a:t>SUB 1 PART Y</a:t>
+            </a:r>
+          </a:p>
+        </p:txBody>
+      </p:sp>
+      <p:cxnSp>
+        <p:nvCxnSpPr>
+          <p:cNvPr id="61" name="Connector: Elbow 60">
+            <a:extLst>
+              <a:ext uri="{FF2B5EF4-FFF2-40B4-BE49-F238E27FC236}">
+                <a16:creationId xmlns:a16="http://schemas.microsoft.com/office/drawing/2014/main" id="{6DCA2357-9193-2109-AF94-6F33F88C24B6}"/>
+              </a:ext>
+            </a:extLst>
+          </p:cNvPr>
+          <p:cNvCxnSpPr>
+            <a:cxnSpLocks/>
+            <a:stCxn id="5" idx="2"/>
+            <a:endCxn id="58" idx="0"/>
+          </p:cNvCxnSpPr>
+          <p:nvPr/>
+        </p:nvCxnSpPr>
+        <p:spPr>
+          <a:xfrm rot="16200000" flipH="1">
+            <a:off x="2767882" y="2046619"/>
+            <a:ext cx="488031" cy="484389"/>
+          </a:xfrm>
+          <a:prstGeom prst="bentConnector3">
+            <a:avLst>
+              <a:gd name="adj1" fmla="val 50000"/>
+            </a:avLst>
+          </a:prstGeom>
+          <a:ln>
+            <a:tailEnd type="triangle"/>
+          </a:ln>
+        </p:spPr>
+        <p:style>
+          <a:lnRef idx="2">
+            <a:schemeClr val="accent1"/>
+          </a:lnRef>
+          <a:fillRef idx="0">
+            <a:schemeClr val="accent1"/>
+          </a:fillRef>
+          <a:effectRef idx="1">
+            <a:schemeClr val="accent1"/>
+          </a:effectRef>
+          <a:fontRef idx="minor">
+            <a:schemeClr val="tx1"/>
+          </a:fontRef>
+        </p:style>
+      </p:cxnSp>
+      <p:sp>
+        <p:nvSpPr>
+          <p:cNvPr id="67" name="Rectangle 66">
+            <a:extLst>
+              <a:ext uri="{FF2B5EF4-FFF2-40B4-BE49-F238E27FC236}">
+                <a16:creationId xmlns:a16="http://schemas.microsoft.com/office/drawing/2014/main" id="{58FD5299-7B42-DEB2-0557-EF1A576EC5AE}"/>
+              </a:ext>
+            </a:extLst>
+          </p:cNvPr>
+          <p:cNvSpPr/>
+          <p:nvPr/>
+        </p:nvSpPr>
+        <p:spPr>
+          <a:xfrm>
+            <a:off x="8714497" y="2425222"/>
+            <a:ext cx="1604434" cy="634999"/>
+          </a:xfrm>
+          <a:prstGeom prst="rect">
+            <a:avLst/>
+          </a:prstGeom>
+        </p:spPr>
+        <p:style>
+          <a:lnRef idx="2">
+            <a:schemeClr val="accent6"/>
+          </a:lnRef>
+          <a:fillRef idx="1">
+            <a:schemeClr val="lt1"/>
+          </a:fillRef>
+          <a:effectRef idx="0">
+            <a:schemeClr val="accent6"/>
+          </a:effectRef>
+          <a:fontRef idx="minor">
+            <a:schemeClr val="dk1"/>
+          </a:fontRef>
+        </p:style>
+        <p:txBody>
+          <a:bodyPr rtlCol="0" anchor="ctr"/>
+          <a:lstStyle/>
+          <a:p>
+            <a:pPr algn="ctr"/>
+            <a:r>
+              <a:rPr lang="en-US" dirty="0"/>
+              <a:t>C10X-00Y </a:t>
+            </a:r>
+          </a:p>
+          <a:p>
+            <a:pPr algn="ctr"/>
+            <a:r>
+              <a:rPr lang="en-US" dirty="0"/>
+              <a:t>PART Y</a:t>
+            </a:r>
+          </a:p>
+        </p:txBody>
+      </p:sp>
+      <p:sp>
+        <p:nvSpPr>
+          <p:cNvPr id="70" name="Rectangle 69">
+            <a:extLst>
+              <a:ext uri="{FF2B5EF4-FFF2-40B4-BE49-F238E27FC236}">
+                <a16:creationId xmlns:a16="http://schemas.microsoft.com/office/drawing/2014/main" id="{84FB85C3-E8D8-196E-EF1C-E57250CB1F3C}"/>
+              </a:ext>
+            </a:extLst>
+          </p:cNvPr>
+          <p:cNvSpPr/>
+          <p:nvPr/>
+        </p:nvSpPr>
+        <p:spPr>
+          <a:xfrm>
+            <a:off x="4264799" y="2531078"/>
+            <a:ext cx="1604434" cy="634999"/>
+          </a:xfrm>
+          <a:prstGeom prst="rect">
+            <a:avLst/>
+          </a:prstGeom>
+        </p:spPr>
+        <p:style>
+          <a:lnRef idx="2">
+            <a:schemeClr val="accent6"/>
+          </a:lnRef>
+          <a:fillRef idx="1">
+            <a:schemeClr val="lt1"/>
+          </a:fillRef>
+          <a:effectRef idx="0">
+            <a:schemeClr val="accent6"/>
+          </a:effectRef>
+          <a:fontRef idx="minor">
+            <a:schemeClr val="dk1"/>
+          </a:fontRef>
+        </p:style>
+        <p:txBody>
+          <a:bodyPr rtlCol="0" anchor="ctr"/>
+          <a:lstStyle/>
+          <a:p>
+            <a:pPr algn="ctr"/>
+            <a:r>
+              <a:rPr lang="en-US" dirty="0"/>
+              <a:t>C102-001 </a:t>
+            </a:r>
+          </a:p>
+          <a:p>
+            <a:pPr algn="ctr"/>
+            <a:r>
+              <a:rPr lang="en-US" dirty="0"/>
+              <a:t>SUB 2 PART 1</a:t>
+            </a:r>
+          </a:p>
+        </p:txBody>
+      </p:sp>
+      <p:cxnSp>
+        <p:nvCxnSpPr>
+          <p:cNvPr id="71" name="Connector: Elbow 70">
+            <a:extLst>
+              <a:ext uri="{FF2B5EF4-FFF2-40B4-BE49-F238E27FC236}">
+                <a16:creationId xmlns:a16="http://schemas.microsoft.com/office/drawing/2014/main" id="{A0E693BC-7C16-0DB6-A8A3-497BED29632C}"/>
+              </a:ext>
+            </a:extLst>
+          </p:cNvPr>
+          <p:cNvCxnSpPr>
+            <a:cxnSpLocks/>
+            <a:stCxn id="6" idx="2"/>
+            <a:endCxn id="70" idx="0"/>
+          </p:cNvCxnSpPr>
+          <p:nvPr/>
+        </p:nvCxnSpPr>
+        <p:spPr>
+          <a:xfrm rot="5400000">
+            <a:off x="5090528" y="2031444"/>
+            <a:ext cx="476122" cy="523146"/>
+          </a:xfrm>
+          <a:prstGeom prst="bentConnector3">
+            <a:avLst>
+              <a:gd name="adj1" fmla="val 50000"/>
+            </a:avLst>
+          </a:prstGeom>
+          <a:ln>
+            <a:tailEnd type="triangle"/>
+          </a:ln>
+        </p:spPr>
+        <p:style>
+          <a:lnRef idx="2">
+            <a:schemeClr val="accent1"/>
+          </a:lnRef>
+          <a:fillRef idx="0">
+            <a:schemeClr val="accent1"/>
+          </a:fillRef>
+          <a:effectRef idx="1">
+            <a:schemeClr val="accent1"/>
+          </a:effectRef>
+          <a:fontRef idx="minor">
+            <a:schemeClr val="tx1"/>
+          </a:fontRef>
+        </p:style>
+      </p:cxnSp>
+      <p:sp>
+        <p:nvSpPr>
+          <p:cNvPr id="72" name="Rectangle 71">
+            <a:extLst>
+              <a:ext uri="{FF2B5EF4-FFF2-40B4-BE49-F238E27FC236}">
+                <a16:creationId xmlns:a16="http://schemas.microsoft.com/office/drawing/2014/main" id="{076089B5-FA8C-FB98-64AD-166511A628E9}"/>
+              </a:ext>
+            </a:extLst>
+          </p:cNvPr>
+          <p:cNvSpPr/>
+          <p:nvPr/>
+        </p:nvSpPr>
+        <p:spPr>
+          <a:xfrm>
+            <a:off x="6024074" y="2527070"/>
+            <a:ext cx="1604434" cy="634999"/>
+          </a:xfrm>
+          <a:prstGeom prst="rect">
+            <a:avLst/>
+          </a:prstGeom>
+        </p:spPr>
+        <p:style>
+          <a:lnRef idx="2">
+            <a:schemeClr val="accent6"/>
+          </a:lnRef>
+          <a:fillRef idx="1">
+            <a:schemeClr val="lt1"/>
+          </a:fillRef>
+          <a:effectRef idx="0">
+            <a:schemeClr val="accent6"/>
+          </a:effectRef>
+          <a:fontRef idx="minor">
+            <a:schemeClr val="dk1"/>
+          </a:fontRef>
+        </p:style>
+        <p:txBody>
+          <a:bodyPr rtlCol="0" anchor="ctr"/>
+          <a:lstStyle/>
+          <a:p>
+            <a:pPr algn="ctr"/>
+            <a:r>
+              <a:rPr lang="en-US" dirty="0"/>
+              <a:t>C102-00Y </a:t>
+            </a:r>
+          </a:p>
+          <a:p>
+            <a:pPr algn="ctr"/>
+            <a:r>
+              <a:rPr lang="en-US" dirty="0"/>
+              <a:t>SUB 2 PART Y</a:t>
+            </a:r>
+          </a:p>
+        </p:txBody>
+      </p:sp>
+      <p:cxnSp>
+        <p:nvCxnSpPr>
+          <p:cNvPr id="73" name="Connector: Elbow 72">
+            <a:extLst>
+              <a:ext uri="{FF2B5EF4-FFF2-40B4-BE49-F238E27FC236}">
+                <a16:creationId xmlns:a16="http://schemas.microsoft.com/office/drawing/2014/main" id="{2C5CB4AA-A4A8-3F5C-24E5-BE9AE7B2A260}"/>
+              </a:ext>
+            </a:extLst>
+          </p:cNvPr>
+          <p:cNvCxnSpPr>
+            <a:cxnSpLocks/>
+            <a:stCxn id="6" idx="2"/>
+            <a:endCxn id="72" idx="0"/>
+          </p:cNvCxnSpPr>
+          <p:nvPr/>
+        </p:nvCxnSpPr>
+        <p:spPr>
+          <a:xfrm rot="16200000" flipH="1">
+            <a:off x="5972169" y="1672948"/>
+            <a:ext cx="472114" cy="1236129"/>
+          </a:xfrm>
+          <a:prstGeom prst="bentConnector3">
+            <a:avLst>
+              <a:gd name="adj1" fmla="val 50000"/>
+            </a:avLst>
+          </a:prstGeom>
+          <a:ln>
+            <a:tailEnd type="triangle"/>
+          </a:ln>
+        </p:spPr>
+        <p:style>
+          <a:lnRef idx="2">
+            <a:schemeClr val="accent1"/>
+          </a:lnRef>
+          <a:fillRef idx="0">
+            <a:schemeClr val="accent1"/>
+          </a:fillRef>
+          <a:effectRef idx="1">
+            <a:schemeClr val="accent1"/>
+          </a:effectRef>
+          <a:fontRef idx="minor">
+            <a:schemeClr val="tx1"/>
+          </a:fontRef>
+        </p:style>
+      </p:cxnSp>
+      <p:cxnSp>
+        <p:nvCxnSpPr>
+          <p:cNvPr id="78" name="Straight Arrow Connector 77">
+            <a:extLst>
+              <a:ext uri="{FF2B5EF4-FFF2-40B4-BE49-F238E27FC236}">
+                <a16:creationId xmlns:a16="http://schemas.microsoft.com/office/drawing/2014/main" id="{3C5C65ED-AC6C-0BEC-2541-4F4B9A85FF46}"/>
+              </a:ext>
+            </a:extLst>
+          </p:cNvPr>
+          <p:cNvCxnSpPr>
+            <a:cxnSpLocks/>
+            <a:stCxn id="41" idx="2"/>
+            <a:endCxn id="67" idx="0"/>
+          </p:cNvCxnSpPr>
+          <p:nvPr/>
+        </p:nvCxnSpPr>
+        <p:spPr>
+          <a:xfrm flipH="1">
+            <a:off x="9516714" y="2044797"/>
+            <a:ext cx="1" cy="380425"/>
+          </a:xfrm>
+          <a:prstGeom prst="straightConnector1">
+            <a:avLst/>
+          </a:prstGeom>
+          <a:ln>
+            <a:tailEnd type="triangle"/>
+          </a:ln>
+        </p:spPr>
+        <p:style>
+          <a:lnRef idx="2">
+            <a:schemeClr val="accent1"/>
+          </a:lnRef>
+          <a:fillRef idx="0">
+            <a:schemeClr val="accent1"/>
+          </a:fillRef>
+          <a:effectRef idx="1">
+            <a:schemeClr val="accent1"/>
+          </a:effectRef>
+          <a:fontRef idx="minor">
+            <a:schemeClr val="tx1"/>
+          </a:fontRef>
+        </p:style>
+      </p:cxnSp>
+      <p:sp>
+        <p:nvSpPr>
+          <p:cNvPr id="13" name="Rectangle 12">
+            <a:extLst>
+              <a:ext uri="{FF2B5EF4-FFF2-40B4-BE49-F238E27FC236}">
+                <a16:creationId xmlns:a16="http://schemas.microsoft.com/office/drawing/2014/main" id="{4CD51862-7109-37AA-041F-22ECCEC8037C}"/>
+              </a:ext>
+            </a:extLst>
+          </p:cNvPr>
+          <p:cNvSpPr/>
+          <p:nvPr/>
+        </p:nvSpPr>
+        <p:spPr>
+          <a:xfrm>
+            <a:off x="8558923" y="3360794"/>
+            <a:ext cx="1915582" cy="968367"/>
+          </a:xfrm>
+          <a:prstGeom prst="rect">
+            <a:avLst/>
+          </a:prstGeom>
+        </p:spPr>
+        <p:style>
+          <a:lnRef idx="2">
+            <a:schemeClr val="accent6"/>
+          </a:lnRef>
+          <a:fillRef idx="1">
+            <a:schemeClr val="lt1"/>
+          </a:fillRef>
+          <a:effectRef idx="0">
+            <a:schemeClr val="accent6"/>
+          </a:effectRef>
+          <a:fontRef idx="minor">
+            <a:schemeClr val="dk1"/>
+          </a:fontRef>
+        </p:style>
+        <p:txBody>
+          <a:bodyPr rtlCol="0" anchor="ctr"/>
+          <a:lstStyle/>
+          <a:p>
+            <a:pPr algn="ctr"/>
+            <a:r>
+              <a:rPr lang="en-US" dirty="0"/>
+              <a:t>C10X-501 </a:t>
+            </a:r>
+          </a:p>
+          <a:p>
+            <a:pPr algn="ctr"/>
+            <a:r>
+              <a:rPr lang="en-US" dirty="0"/>
+              <a:t>SUB ASSY X </a:t>
+            </a:r>
+          </a:p>
+          <a:p>
+            <a:pPr algn="ctr"/>
+            <a:r>
+              <a:rPr lang="en-US" dirty="0"/>
+              <a:t>ASSEMBLY FILE</a:t>
+            </a:r>
+          </a:p>
+        </p:txBody>
+      </p:sp>
+      <p:cxnSp>
+        <p:nvCxnSpPr>
+          <p:cNvPr id="15" name="Straight Arrow Connector 14">
+            <a:extLst>
+              <a:ext uri="{FF2B5EF4-FFF2-40B4-BE49-F238E27FC236}">
+                <a16:creationId xmlns:a16="http://schemas.microsoft.com/office/drawing/2014/main" id="{4058348B-95D3-6DB5-D416-A1C4CD5E3BC3}"/>
+              </a:ext>
+            </a:extLst>
+          </p:cNvPr>
+          <p:cNvCxnSpPr>
+            <a:cxnSpLocks/>
+            <a:stCxn id="67" idx="2"/>
+            <a:endCxn id="13" idx="0"/>
+          </p:cNvCxnSpPr>
+          <p:nvPr/>
+        </p:nvCxnSpPr>
+        <p:spPr>
+          <a:xfrm>
+            <a:off x="9516714" y="3060221"/>
+            <a:ext cx="0" cy="300573"/>
+          </a:xfrm>
+          <a:prstGeom prst="straightConnector1">
+            <a:avLst/>
+          </a:prstGeom>
+          <a:ln>
+            <a:tailEnd type="triangle"/>
+          </a:ln>
+        </p:spPr>
+        <p:style>
+          <a:lnRef idx="2">
+            <a:schemeClr val="accent1"/>
+          </a:lnRef>
+          <a:fillRef idx="0">
+            <a:schemeClr val="accent1"/>
+          </a:fillRef>
+          <a:effectRef idx="1">
+            <a:schemeClr val="accent1"/>
+          </a:effectRef>
+          <a:fontRef idx="minor">
+            <a:schemeClr val="tx1"/>
+          </a:fontRef>
+        </p:style>
+      </p:cxnSp>
+      <p:cxnSp>
+        <p:nvCxnSpPr>
+          <p:cNvPr id="19" name="Connector: Elbow 18">
+            <a:extLst>
+              <a:ext uri="{FF2B5EF4-FFF2-40B4-BE49-F238E27FC236}">
+                <a16:creationId xmlns:a16="http://schemas.microsoft.com/office/drawing/2014/main" id="{43F7F7C1-791D-A3D3-4EB5-3D4B7313C2F3}"/>
+              </a:ext>
+            </a:extLst>
+          </p:cNvPr>
+          <p:cNvCxnSpPr>
+            <a:cxnSpLocks/>
+            <a:stCxn id="58" idx="2"/>
+            <a:endCxn id="9" idx="0"/>
+          </p:cNvCxnSpPr>
+          <p:nvPr/>
+        </p:nvCxnSpPr>
+        <p:spPr>
+          <a:xfrm rot="5400000">
+            <a:off x="2763874" y="3173657"/>
+            <a:ext cx="496047" cy="484390"/>
+          </a:xfrm>
+          <a:prstGeom prst="bentConnector3">
+            <a:avLst>
+              <a:gd name="adj1" fmla="val 50000"/>
+            </a:avLst>
+          </a:prstGeom>
+          <a:ln>
+            <a:tailEnd type="triangle"/>
+          </a:ln>
+        </p:spPr>
+        <p:style>
+          <a:lnRef idx="2">
+            <a:schemeClr val="accent1"/>
+          </a:lnRef>
+          <a:fillRef idx="0">
+            <a:schemeClr val="accent1"/>
+          </a:fillRef>
+          <a:effectRef idx="1">
+            <a:schemeClr val="accent1"/>
+          </a:effectRef>
+          <a:fontRef idx="minor">
+            <a:schemeClr val="tx1"/>
+          </a:fontRef>
+        </p:style>
+      </p:cxnSp>
+      <p:cxnSp>
+        <p:nvCxnSpPr>
+          <p:cNvPr id="22" name="Connector: Elbow 21">
+            <a:extLst>
+              <a:ext uri="{FF2B5EF4-FFF2-40B4-BE49-F238E27FC236}">
+                <a16:creationId xmlns:a16="http://schemas.microsoft.com/office/drawing/2014/main" id="{B73CA269-2497-1146-D1A3-2B0DC1E914CD}"/>
+              </a:ext>
+            </a:extLst>
+          </p:cNvPr>
+          <p:cNvCxnSpPr>
+            <a:cxnSpLocks/>
+            <a:stCxn id="7" idx="2"/>
+            <a:endCxn id="9" idx="0"/>
+          </p:cNvCxnSpPr>
+          <p:nvPr/>
+        </p:nvCxnSpPr>
+        <p:spPr>
+          <a:xfrm rot="16200000" flipH="1">
+            <a:off x="1886240" y="2780413"/>
+            <a:ext cx="492039" cy="1274885"/>
+          </a:xfrm>
+          <a:prstGeom prst="bentConnector3">
+            <a:avLst>
+              <a:gd name="adj1" fmla="val 50000"/>
+            </a:avLst>
+          </a:prstGeom>
+          <a:ln>
+            <a:tailEnd type="triangle"/>
+          </a:ln>
+        </p:spPr>
+        <p:style>
+          <a:lnRef idx="2">
+            <a:schemeClr val="accent1"/>
+          </a:lnRef>
+          <a:fillRef idx="0">
+            <a:schemeClr val="accent1"/>
+          </a:fillRef>
+          <a:effectRef idx="1">
+            <a:schemeClr val="accent1"/>
+          </a:effectRef>
+          <a:fontRef idx="minor">
+            <a:schemeClr val="tx1"/>
+          </a:fontRef>
+        </p:style>
+      </p:cxnSp>
+      <p:sp>
+        <p:nvSpPr>
+          <p:cNvPr id="33" name="Rectangle 32">
+            <a:extLst>
+              <a:ext uri="{FF2B5EF4-FFF2-40B4-BE49-F238E27FC236}">
+                <a16:creationId xmlns:a16="http://schemas.microsoft.com/office/drawing/2014/main" id="{55A18DD5-055B-2333-2495-83E6C689B5AA}"/>
+              </a:ext>
+            </a:extLst>
+          </p:cNvPr>
+          <p:cNvSpPr/>
+          <p:nvPr/>
+        </p:nvSpPr>
+        <p:spPr>
+          <a:xfrm>
+            <a:off x="4632370" y="3663875"/>
+            <a:ext cx="1915582" cy="968367"/>
+          </a:xfrm>
+          <a:prstGeom prst="rect">
+            <a:avLst/>
+          </a:prstGeom>
+        </p:spPr>
+        <p:style>
+          <a:lnRef idx="2">
+            <a:schemeClr val="accent6"/>
+          </a:lnRef>
+          <a:fillRef idx="1">
+            <a:schemeClr val="lt1"/>
+          </a:fillRef>
+          <a:effectRef idx="0">
+            <a:schemeClr val="accent6"/>
+          </a:effectRef>
+          <a:fontRef idx="minor">
+            <a:schemeClr val="dk1"/>
+          </a:fontRef>
+        </p:style>
+        <p:txBody>
+          <a:bodyPr rtlCol="0" anchor="ctr"/>
+          <a:lstStyle/>
+          <a:p>
+            <a:pPr algn="ctr"/>
+            <a:r>
+              <a:rPr lang="en-US" dirty="0"/>
+              <a:t>C102-501 </a:t>
+            </a:r>
+          </a:p>
+          <a:p>
+            <a:pPr algn="ctr"/>
+            <a:r>
+              <a:rPr lang="en-US" dirty="0"/>
+              <a:t>SUB ASSY 2 </a:t>
+            </a:r>
+          </a:p>
+          <a:p>
+            <a:pPr algn="ctr"/>
+            <a:r>
+              <a:rPr lang="en-US" dirty="0"/>
+              <a:t>ASSEMBLY FILE</a:t>
+            </a:r>
+          </a:p>
+        </p:txBody>
+      </p:sp>
+      <p:cxnSp>
+        <p:nvCxnSpPr>
+          <p:cNvPr id="34" name="Connector: Elbow 33">
+            <a:extLst>
+              <a:ext uri="{FF2B5EF4-FFF2-40B4-BE49-F238E27FC236}">
+                <a16:creationId xmlns:a16="http://schemas.microsoft.com/office/drawing/2014/main" id="{FE3D9EA5-0A44-ED39-6E7F-50E0A3BA5D5B}"/>
+              </a:ext>
+            </a:extLst>
+          </p:cNvPr>
+          <p:cNvCxnSpPr>
+            <a:cxnSpLocks/>
+            <a:stCxn id="70" idx="2"/>
+            <a:endCxn id="33" idx="0"/>
+          </p:cNvCxnSpPr>
+          <p:nvPr/>
+        </p:nvCxnSpPr>
+        <p:spPr>
+          <a:xfrm rot="16200000" flipH="1">
+            <a:off x="5079689" y="3153403"/>
+            <a:ext cx="497798" cy="523145"/>
+          </a:xfrm>
+          <a:prstGeom prst="bentConnector3">
+            <a:avLst>
+              <a:gd name="adj1" fmla="val 50000"/>
+            </a:avLst>
+          </a:prstGeom>
+          <a:ln>
+            <a:tailEnd type="triangle"/>
+          </a:ln>
+        </p:spPr>
+        <p:style>
+          <a:lnRef idx="2">
+            <a:schemeClr val="accent1"/>
+          </a:lnRef>
+          <a:fillRef idx="0">
+            <a:schemeClr val="accent1"/>
+          </a:fillRef>
+          <a:effectRef idx="1">
+            <a:schemeClr val="accent1"/>
+          </a:effectRef>
+          <a:fontRef idx="minor">
+            <a:schemeClr val="tx1"/>
+          </a:fontRef>
+        </p:style>
+      </p:cxnSp>
+      <p:cxnSp>
+        <p:nvCxnSpPr>
+          <p:cNvPr id="37" name="Connector: Elbow 36">
+            <a:extLst>
+              <a:ext uri="{FF2B5EF4-FFF2-40B4-BE49-F238E27FC236}">
+                <a16:creationId xmlns:a16="http://schemas.microsoft.com/office/drawing/2014/main" id="{055246A2-57AF-5929-36A3-9E31B8ECACF2}"/>
+              </a:ext>
+            </a:extLst>
+          </p:cNvPr>
+          <p:cNvCxnSpPr>
+            <a:cxnSpLocks/>
+            <a:stCxn id="72" idx="2"/>
+            <a:endCxn id="33" idx="0"/>
+          </p:cNvCxnSpPr>
+          <p:nvPr/>
+        </p:nvCxnSpPr>
+        <p:spPr>
+          <a:xfrm rot="5400000">
+            <a:off x="5957323" y="2794907"/>
+            <a:ext cx="501806" cy="1236130"/>
+          </a:xfrm>
+          <a:prstGeom prst="bentConnector3">
+            <a:avLst>
+              <a:gd name="adj1" fmla="val 50000"/>
+            </a:avLst>
+          </a:prstGeom>
+          <a:ln>
+            <a:tailEnd type="triangle"/>
+          </a:ln>
+        </p:spPr>
+        <p:style>
+          <a:lnRef idx="2">
+            <a:schemeClr val="accent1"/>
+          </a:lnRef>
+          <a:fillRef idx="0">
+            <a:schemeClr val="accent1"/>
+          </a:fillRef>
+          <a:effectRef idx="1">
+            <a:schemeClr val="accent1"/>
+          </a:effectRef>
+          <a:fontRef idx="minor">
+            <a:schemeClr val="tx1"/>
+          </a:fontRef>
+        </p:style>
+      </p:cxnSp>
+      <p:cxnSp>
+        <p:nvCxnSpPr>
+          <p:cNvPr id="44" name="Straight Arrow Connector 43">
+            <a:extLst>
+              <a:ext uri="{FF2B5EF4-FFF2-40B4-BE49-F238E27FC236}">
+                <a16:creationId xmlns:a16="http://schemas.microsoft.com/office/drawing/2014/main" id="{04E29571-3D90-F88E-9986-E93D7C005443}"/>
+              </a:ext>
+            </a:extLst>
+          </p:cNvPr>
+          <p:cNvCxnSpPr>
+            <a:cxnSpLocks/>
+            <a:stCxn id="33" idx="2"/>
+            <a:endCxn id="11" idx="0"/>
+          </p:cNvCxnSpPr>
+          <p:nvPr/>
+        </p:nvCxnSpPr>
+        <p:spPr>
+          <a:xfrm>
+            <a:off x="5590161" y="4632242"/>
+            <a:ext cx="0" cy="705743"/>
+          </a:xfrm>
+          <a:prstGeom prst="straightConnector1">
+            <a:avLst/>
+          </a:prstGeom>
+          <a:ln>
+            <a:tailEnd type="triangle"/>
+          </a:ln>
+        </p:spPr>
+        <p:style>
+          <a:lnRef idx="2">
+            <a:schemeClr val="accent1"/>
+          </a:lnRef>
+          <a:fillRef idx="0">
+            <a:schemeClr val="accent1"/>
+          </a:fillRef>
+          <a:effectRef idx="1">
+            <a:schemeClr val="accent1"/>
+          </a:effectRef>
+          <a:fontRef idx="minor">
+            <a:schemeClr val="tx1"/>
+          </a:fontRef>
+        </p:style>
+      </p:cxnSp>
+      <p:cxnSp>
+        <p:nvCxnSpPr>
+          <p:cNvPr id="63" name="Connector: Elbow 62">
+            <a:extLst>
+              <a:ext uri="{FF2B5EF4-FFF2-40B4-BE49-F238E27FC236}">
+                <a16:creationId xmlns:a16="http://schemas.microsoft.com/office/drawing/2014/main" id="{7860A970-37FC-6AAC-1E97-A33D69036C93}"/>
+              </a:ext>
+            </a:extLst>
+          </p:cNvPr>
+          <p:cNvCxnSpPr>
+            <a:cxnSpLocks/>
+            <a:stCxn id="13" idx="2"/>
+            <a:endCxn id="11" idx="0"/>
+          </p:cNvCxnSpPr>
+          <p:nvPr/>
+        </p:nvCxnSpPr>
+        <p:spPr>
+          <a:xfrm rot="5400000">
+            <a:off x="7049026" y="2870297"/>
+            <a:ext cx="1008824" cy="3926553"/>
+          </a:xfrm>
+          <a:prstGeom prst="bentConnector3">
+            <a:avLst>
+              <a:gd name="adj1" fmla="val 64137"/>
+            </a:avLst>
+          </a:prstGeom>
+          <a:ln>
+            <a:tailEnd type="triangle"/>
+          </a:ln>
+        </p:spPr>
+        <p:style>
+          <a:lnRef idx="2">
+            <a:schemeClr val="accent1"/>
+          </a:lnRef>
+          <a:fillRef idx="0">
+            <a:schemeClr val="accent1"/>
+          </a:fillRef>
+          <a:effectRef idx="1">
+            <a:schemeClr val="accent1"/>
+          </a:effectRef>
+          <a:fontRef idx="minor">
+            <a:schemeClr val="tx1"/>
+          </a:fontRef>
+        </p:style>
+      </p:cxnSp>
+      <p:cxnSp>
+        <p:nvCxnSpPr>
+          <p:cNvPr id="69" name="Straight Connector 68">
+            <a:extLst>
+              <a:ext uri="{FF2B5EF4-FFF2-40B4-BE49-F238E27FC236}">
+                <a16:creationId xmlns:a16="http://schemas.microsoft.com/office/drawing/2014/main" id="{6C60CADA-AC9E-7F73-4B6A-2DEB8D0A4982}"/>
+              </a:ext>
+            </a:extLst>
+          </p:cNvPr>
+          <p:cNvCxnSpPr>
+            <a:cxnSpLocks/>
+          </p:cNvCxnSpPr>
+          <p:nvPr/>
+        </p:nvCxnSpPr>
+        <p:spPr>
+          <a:xfrm>
+            <a:off x="7919981" y="550309"/>
+            <a:ext cx="36609" cy="5019824"/>
+          </a:xfrm>
+          <a:prstGeom prst="line">
+            <a:avLst/>
+          </a:prstGeom>
+          <a:ln>
+            <a:prstDash val="lgDash"/>
+          </a:ln>
+        </p:spPr>
+        <p:style>
+          <a:lnRef idx="2">
+            <a:schemeClr val="accent5"/>
+          </a:lnRef>
+          <a:fillRef idx="0">
+            <a:schemeClr val="accent5"/>
+          </a:fillRef>
+          <a:effectRef idx="1">
+            <a:schemeClr val="accent5"/>
+          </a:effectRef>
+          <a:fontRef idx="minor">
+            <a:schemeClr val="tx1"/>
+          </a:fontRef>
+        </p:style>
+      </p:cxnSp>
+      <p:sp>
+        <p:nvSpPr>
+          <p:cNvPr id="80" name="TextBox 79">
+            <a:extLst>
+              <a:ext uri="{FF2B5EF4-FFF2-40B4-BE49-F238E27FC236}">
+                <a16:creationId xmlns:a16="http://schemas.microsoft.com/office/drawing/2014/main" id="{F752A758-3B14-E675-FA9A-6DF5B9A7C535}"/>
+              </a:ext>
+            </a:extLst>
+          </p:cNvPr>
+          <p:cNvSpPr txBox="1"/>
+          <p:nvPr/>
+        </p:nvSpPr>
+        <p:spPr>
+          <a:xfrm>
+            <a:off x="8170813" y="630740"/>
+            <a:ext cx="2315612" cy="369332"/>
+          </a:xfrm>
+          <a:prstGeom prst="rect">
+            <a:avLst/>
+          </a:prstGeom>
+          <a:noFill/>
+        </p:spPr>
+        <p:txBody>
+          <a:bodyPr wrap="square">
+            <a:spAutoFit/>
+          </a:bodyPr>
+          <a:lstStyle/>
+          <a:p>
+            <a:pPr algn="ctr"/>
+            <a:r>
+              <a:rPr lang="en-US" dirty="0">
+                <a:solidFill>
+                  <a:schemeClr val="accent5"/>
+                </a:solidFill>
+              </a:rPr>
+              <a:t>General Numbering</a:t>
+            </a:r>
+          </a:p>
+        </p:txBody>
+      </p:sp>
+    </p:spTree>
+    <p:extLst>
+      <p:ext uri="{BB962C8B-B14F-4D97-AF65-F5344CB8AC3E}">
+        <p14:creationId xmlns:p14="http://schemas.microsoft.com/office/powerpoint/2010/main" val="3917659605"/>
+      </p:ext>
+    </p:extLst>
+  </p:cSld>
+  <p:clrMapOvr>
+    <a:masterClrMapping/>
+  </p:clrMapOvr>
+</p:sld>
+</file>
+
+<file path=ppt/slides/slide9.xml><?xml version="1.0" encoding="utf-8"?>
+<p:sld xmlns:a="http://schemas.openxmlformats.org/drawingml/2006/main" xmlns:r="http://schemas.openxmlformats.org/officeDocument/2006/relationships" xmlns:p="http://schemas.openxmlformats.org/presentationml/2006/main">
+  <p:cSld>
+    <p:spTree>
+      <p:nvGrpSpPr>
+        <p:cNvPr id="1" name=""/>
+        <p:cNvGrpSpPr/>
+        <p:nvPr/>
+      </p:nvGrpSpPr>
+      <p:grpSpPr>
+        <a:xfrm>
+          <a:off x="0" y="0"/>
+          <a:ext cx="0" cy="0"/>
+          <a:chOff x="0" y="0"/>
+          <a:chExt cx="0" cy="0"/>
+        </a:xfrm>
+      </p:grpSpPr>
+      <p:sp>
+        <p:nvSpPr>
+          <p:cNvPr id="2" name="Title 1">
+            <a:extLst>
+              <a:ext uri="{FF2B5EF4-FFF2-40B4-BE49-F238E27FC236}">
+                <a16:creationId xmlns:a16="http://schemas.microsoft.com/office/drawing/2014/main" id="{ACFDF4D6-9F68-000C-DDD2-4AF083AA2618}"/>
+              </a:ext>
+            </a:extLst>
+          </p:cNvPr>
+          <p:cNvSpPr>
+            <a:spLocks noGrp="1"/>
+          </p:cNvSpPr>
+          <p:nvPr>
+            <p:ph type="ctrTitle"/>
+          </p:nvPr>
+        </p:nvSpPr>
+        <p:spPr/>
+        <p:txBody>
+          <a:bodyPr/>
+          <a:lstStyle/>
+          <a:p>
+            <a:r>
+              <a:rPr lang="en-US" dirty="0"/>
+              <a:t>So you want to use the drawing template?</a:t>
+            </a:r>
+          </a:p>
+        </p:txBody>
+      </p:sp>
+      <p:sp>
+        <p:nvSpPr>
+          <p:cNvPr id="3" name="Subtitle 2">
+            <a:extLst>
+              <a:ext uri="{FF2B5EF4-FFF2-40B4-BE49-F238E27FC236}">
+                <a16:creationId xmlns:a16="http://schemas.microsoft.com/office/drawing/2014/main" id="{A614B1D9-FF93-8EF6-7E07-49721082C74C}"/>
+              </a:ext>
+            </a:extLst>
+          </p:cNvPr>
+          <p:cNvSpPr>
+            <a:spLocks noGrp="1"/>
+          </p:cNvSpPr>
+          <p:nvPr>
+            <p:ph type="subTitle" idx="1"/>
+          </p:nvPr>
+        </p:nvSpPr>
+        <p:spPr/>
+        <p:txBody>
+          <a:bodyPr/>
+          <a:lstStyle/>
+          <a:p>
+            <a:r>
+              <a:rPr lang="en-US" dirty="0"/>
+              <a:t>Good thing it’s </a:t>
+            </a:r>
+            <a:r>
+              <a:rPr lang="en-US" dirty="0" err="1"/>
+              <a:t>ezpz</a:t>
+            </a:r>
+            <a:endParaRPr lang="en-US" dirty="0"/>
+          </a:p>
+        </p:txBody>
+      </p:sp>
+    </p:spTree>
+    <p:extLst>
+      <p:ext uri="{BB962C8B-B14F-4D97-AF65-F5344CB8AC3E}">
+        <p14:creationId xmlns:p14="http://schemas.microsoft.com/office/powerpoint/2010/main" val="2244326159"/>
       </p:ext>
     </p:extLst>
   </p:cSld>
@@ -5907,4 +9148,319 @@
     </a:ext>
   </a:extLst>
 </a:theme>
+</file>
+
+<file path=ppt/theme/theme2.xml><?xml version="1.0" encoding="utf-8"?>
+<a:theme xmlns:a="http://schemas.openxmlformats.org/drawingml/2006/main" name="Office Theme">
+  <a:themeElements>
+    <a:clrScheme name="Office">
+      <a:dk1>
+        <a:sysClr val="windowText" lastClr="000000"/>
+      </a:dk1>
+      <a:lt1>
+        <a:sysClr val="window" lastClr="FFFFFF"/>
+      </a:lt1>
+      <a:dk2>
+        <a:srgbClr val="0E2841"/>
+      </a:dk2>
+      <a:lt2>
+        <a:srgbClr val="E8E8E8"/>
+      </a:lt2>
+      <a:accent1>
+        <a:srgbClr val="156082"/>
+      </a:accent1>
+      <a:accent2>
+        <a:srgbClr val="E97132"/>
+      </a:accent2>
+      <a:accent3>
+        <a:srgbClr val="196B24"/>
+      </a:accent3>
+      <a:accent4>
+        <a:srgbClr val="0F9ED5"/>
+      </a:accent4>
+      <a:accent5>
+        <a:srgbClr val="A02B93"/>
+      </a:accent5>
+      <a:accent6>
+        <a:srgbClr val="4EA72E"/>
+      </a:accent6>
+      <a:hlink>
+        <a:srgbClr val="467886"/>
+      </a:hlink>
+      <a:folHlink>
+        <a:srgbClr val="96607D"/>
+      </a:folHlink>
+    </a:clrScheme>
+    <a:fontScheme name="Office">
+      <a:majorFont>
+        <a:latin typeface="Aptos Display" panose="02110004020202020204"/>
+        <a:ea typeface=""/>
+        <a:cs typeface=""/>
+        <a:font script="Jpan" typeface="游ゴシック Light"/>
+        <a:font script="Hang" typeface="맑은 고딕"/>
+        <a:font script="Hans" typeface="等线 Light"/>
+        <a:font script="Hant" typeface="新細明體"/>
+        <a:font script="Arab" typeface="Times New Roman"/>
+        <a:font script="Hebr" typeface="Times New Roman"/>
+        <a:font script="Thai" typeface="Angsana New"/>
+        <a:font script="Ethi" typeface="Nyala"/>
+        <a:font script="Beng" typeface="Vrinda"/>
+        <a:font script="Gujr" typeface="Shruti"/>
+        <a:font script="Khmr" typeface="MoolBoran"/>
+        <a:font script="Knda" typeface="Tunga"/>
+        <a:font script="Guru" typeface="Raavi"/>
+        <a:font script="Cans" typeface="Euphemia"/>
+        <a:font script="Cher" typeface="Plantagenet Cherokee"/>
+        <a:font script="Yiii" typeface="Microsoft Yi Baiti"/>
+        <a:font script="Tibt" typeface="Microsoft Himalaya"/>
+        <a:font script="Thaa" typeface="MV Boli"/>
+        <a:font script="Deva" typeface="Mangal"/>
+        <a:font script="Telu" typeface="Gautami"/>
+        <a:font script="Taml" typeface="Latha"/>
+        <a:font script="Syrc" typeface="Estrangelo Edessa"/>
+        <a:font script="Orya" typeface="Kalinga"/>
+        <a:font script="Mlym" typeface="Kartika"/>
+        <a:font script="Laoo" typeface="DokChampa"/>
+        <a:font script="Sinh" typeface="Iskoola Pota"/>
+        <a:font script="Mong" typeface="Mongolian Baiti"/>
+        <a:font script="Viet" typeface="Times New Roman"/>
+        <a:font script="Uigh" typeface="Microsoft Uighur"/>
+        <a:font script="Geor" typeface="Sylfaen"/>
+        <a:font script="Armn" typeface="Arial"/>
+        <a:font script="Bugi" typeface="Leelawadee UI"/>
+        <a:font script="Bopo" typeface="Microsoft JhengHei"/>
+        <a:font script="Java" typeface="Javanese Text"/>
+        <a:font script="Lisu" typeface="Segoe UI"/>
+        <a:font script="Mymr" typeface="Myanmar Text"/>
+        <a:font script="Nkoo" typeface="Ebrima"/>
+        <a:font script="Olck" typeface="Nirmala UI"/>
+        <a:font script="Osma" typeface="Ebrima"/>
+        <a:font script="Phag" typeface="Phagspa"/>
+        <a:font script="Syrn" typeface="Estrangelo Edessa"/>
+        <a:font script="Syrj" typeface="Estrangelo Edessa"/>
+        <a:font script="Syre" typeface="Estrangelo Edessa"/>
+        <a:font script="Sora" typeface="Nirmala UI"/>
+        <a:font script="Tale" typeface="Microsoft Tai Le"/>
+        <a:font script="Talu" typeface="Microsoft New Tai Lue"/>
+        <a:font script="Tfng" typeface="Ebrima"/>
+      </a:majorFont>
+      <a:minorFont>
+        <a:latin typeface="Aptos" panose="02110004020202020204"/>
+        <a:ea typeface=""/>
+        <a:cs typeface=""/>
+        <a:font script="Jpan" typeface="游ゴシック"/>
+        <a:font script="Hang" typeface="맑은 고딕"/>
+        <a:font script="Hans" typeface="等线"/>
+        <a:font script="Hant" typeface="新細明體"/>
+        <a:font script="Arab" typeface="Arial"/>
+        <a:font script="Hebr" typeface="Arial"/>
+        <a:font script="Thai" typeface="Cordia New"/>
+        <a:font script="Ethi" typeface="Nyala"/>
+        <a:font script="Beng" typeface="Vrinda"/>
+        <a:font script="Gujr" typeface="Shruti"/>
+        <a:font script="Khmr" typeface="DaunPenh"/>
+        <a:font script="Knda" typeface="Tunga"/>
+        <a:font script="Guru" typeface="Raavi"/>
+        <a:font script="Cans" typeface="Euphemia"/>
+        <a:font script="Cher" typeface="Plantagenet Cherokee"/>
+        <a:font script="Yiii" typeface="Microsoft Yi Baiti"/>
+        <a:font script="Tibt" typeface="Microsoft Himalaya"/>
+        <a:font script="Thaa" typeface="MV Boli"/>
+        <a:font script="Deva" typeface="Mangal"/>
+        <a:font script="Telu" typeface="Gautami"/>
+        <a:font script="Taml" typeface="Latha"/>
+        <a:font script="Syrc" typeface="Estrangelo Edessa"/>
+        <a:font script="Orya" typeface="Kalinga"/>
+        <a:font script="Mlym" typeface="Kartika"/>
+        <a:font script="Laoo" typeface="DokChampa"/>
+        <a:font script="Sinh" typeface="Iskoola Pota"/>
+        <a:font script="Mong" typeface="Mongolian Baiti"/>
+        <a:font script="Viet" typeface="Arial"/>
+        <a:font script="Uigh" typeface="Microsoft Uighur"/>
+        <a:font script="Geor" typeface="Sylfaen"/>
+        <a:font script="Armn" typeface="Arial"/>
+        <a:font script="Bugi" typeface="Leelawadee UI"/>
+        <a:font script="Bopo" typeface="Microsoft JhengHei"/>
+        <a:font script="Java" typeface="Javanese Text"/>
+        <a:font script="Lisu" typeface="Segoe UI"/>
+        <a:font script="Mymr" typeface="Myanmar Text"/>
+        <a:font script="Nkoo" typeface="Ebrima"/>
+        <a:font script="Olck" typeface="Nirmala UI"/>
+        <a:font script="Osma" typeface="Ebrima"/>
+        <a:font script="Phag" typeface="Phagspa"/>
+        <a:font script="Syrn" typeface="Estrangelo Edessa"/>
+        <a:font script="Syrj" typeface="Estrangelo Edessa"/>
+        <a:font script="Syre" typeface="Estrangelo Edessa"/>
+        <a:font script="Sora" typeface="Nirmala UI"/>
+        <a:font script="Tale" typeface="Microsoft Tai Le"/>
+        <a:font script="Talu" typeface="Microsoft New Tai Lue"/>
+        <a:font script="Tfng" typeface="Ebrima"/>
+      </a:minorFont>
+    </a:fontScheme>
+    <a:fmtScheme name="Office">
+      <a:fillStyleLst>
+        <a:solidFill>
+          <a:schemeClr val="phClr"/>
+        </a:solidFill>
+        <a:gradFill rotWithShape="1">
+          <a:gsLst>
+            <a:gs pos="0">
+              <a:schemeClr val="phClr">
+                <a:lumMod val="110000"/>
+                <a:satMod val="105000"/>
+                <a:tint val="67000"/>
+              </a:schemeClr>
+            </a:gs>
+            <a:gs pos="50000">
+              <a:schemeClr val="phClr">
+                <a:lumMod val="105000"/>
+                <a:satMod val="103000"/>
+                <a:tint val="73000"/>
+              </a:schemeClr>
+            </a:gs>
+            <a:gs pos="100000">
+              <a:schemeClr val="phClr">
+                <a:lumMod val="105000"/>
+                <a:satMod val="109000"/>
+                <a:tint val="81000"/>
+              </a:schemeClr>
+            </a:gs>
+          </a:gsLst>
+          <a:lin ang="5400000" scaled="0"/>
+        </a:gradFill>
+        <a:gradFill rotWithShape="1">
+          <a:gsLst>
+            <a:gs pos="0">
+              <a:schemeClr val="phClr">
+                <a:satMod val="103000"/>
+                <a:lumMod val="102000"/>
+                <a:tint val="94000"/>
+              </a:schemeClr>
+            </a:gs>
+            <a:gs pos="50000">
+              <a:schemeClr val="phClr">
+                <a:satMod val="110000"/>
+                <a:lumMod val="100000"/>
+                <a:shade val="100000"/>
+              </a:schemeClr>
+            </a:gs>
+            <a:gs pos="100000">
+              <a:schemeClr val="phClr">
+                <a:lumMod val="99000"/>
+                <a:satMod val="120000"/>
+                <a:shade val="78000"/>
+              </a:schemeClr>
+            </a:gs>
+          </a:gsLst>
+          <a:lin ang="5400000" scaled="0"/>
+        </a:gradFill>
+      </a:fillStyleLst>
+      <a:lnStyleLst>
+        <a:ln w="12700" cap="flat" cmpd="sng" algn="ctr">
+          <a:solidFill>
+            <a:schemeClr val="phClr"/>
+          </a:solidFill>
+          <a:prstDash val="solid"/>
+          <a:miter lim="800000"/>
+        </a:ln>
+        <a:ln w="19050" cap="flat" cmpd="sng" algn="ctr">
+          <a:solidFill>
+            <a:schemeClr val="phClr"/>
+          </a:solidFill>
+          <a:prstDash val="solid"/>
+          <a:miter lim="800000"/>
+        </a:ln>
+        <a:ln w="25400" cap="flat" cmpd="sng" algn="ctr">
+          <a:solidFill>
+            <a:schemeClr val="phClr"/>
+          </a:solidFill>
+          <a:prstDash val="solid"/>
+          <a:miter lim="800000"/>
+        </a:ln>
+      </a:lnStyleLst>
+      <a:effectStyleLst>
+        <a:effectStyle>
+          <a:effectLst/>
+        </a:effectStyle>
+        <a:effectStyle>
+          <a:effectLst/>
+        </a:effectStyle>
+        <a:effectStyle>
+          <a:effectLst>
+            <a:outerShdw blurRad="57150" dist="19050" dir="5400000" algn="ctr" rotWithShape="0">
+              <a:srgbClr val="000000">
+                <a:alpha val="63000"/>
+              </a:srgbClr>
+            </a:outerShdw>
+          </a:effectLst>
+        </a:effectStyle>
+      </a:effectStyleLst>
+      <a:bgFillStyleLst>
+        <a:solidFill>
+          <a:schemeClr val="phClr"/>
+        </a:solidFill>
+        <a:solidFill>
+          <a:schemeClr val="phClr">
+            <a:tint val="95000"/>
+            <a:satMod val="170000"/>
+          </a:schemeClr>
+        </a:solidFill>
+        <a:gradFill rotWithShape="1">
+          <a:gsLst>
+            <a:gs pos="0">
+              <a:schemeClr val="phClr">
+                <a:tint val="93000"/>
+                <a:satMod val="150000"/>
+                <a:shade val="98000"/>
+                <a:lumMod val="102000"/>
+              </a:schemeClr>
+            </a:gs>
+            <a:gs pos="50000">
+              <a:schemeClr val="phClr">
+                <a:tint val="98000"/>
+                <a:satMod val="130000"/>
+                <a:shade val="90000"/>
+                <a:lumMod val="103000"/>
+              </a:schemeClr>
+            </a:gs>
+            <a:gs pos="100000">
+              <a:schemeClr val="phClr">
+                <a:shade val="63000"/>
+                <a:satMod val="120000"/>
+              </a:schemeClr>
+            </a:gs>
+          </a:gsLst>
+          <a:lin ang="5400000" scaled="0"/>
+        </a:gradFill>
+      </a:bgFillStyleLst>
+    </a:fmtScheme>
+  </a:themeElements>
+  <a:objectDefaults>
+    <a:lnDef>
+      <a:spPr/>
+      <a:bodyPr/>
+      <a:lstStyle/>
+      <a:style>
+        <a:lnRef idx="2">
+          <a:schemeClr val="accent1"/>
+        </a:lnRef>
+        <a:fillRef idx="0">
+          <a:schemeClr val="accent1"/>
+        </a:fillRef>
+        <a:effectRef idx="1">
+          <a:schemeClr val="accent1"/>
+        </a:effectRef>
+        <a:fontRef idx="minor">
+          <a:schemeClr val="tx1"/>
+        </a:fontRef>
+      </a:style>
+    </a:lnDef>
+  </a:objectDefaults>
+  <a:extraClrSchemeLst/>
+  <a:extLst>
+    <a:ext uri="{05A4C25C-085E-4340-85A3-A5531E510DB2}">
+      <thm15:themeFamily xmlns:thm15="http://schemas.microsoft.com/office/thememl/2012/main" name="Office Theme" id="{2E142A2C-CD16-42D6-873A-C26D2A0506FA}" vid="{1BDDFF52-6CD6-40A5-AB3C-68EB2F1E4D0A}"/>
+    </a:ext>
+  </a:extLst>
+</a:theme>
 </file>
</xml_diff>